<commit_message>
2021.11.30 Work JS Core #2 Prototype ver1 Finished Jiawei Wang
</commit_message>
<xml_diff>
--- a/2021-12-03/Sources/JSCore.pptx
+++ b/2021-12-03/Sources/JSCore.pptx
@@ -4,12 +4,15 @@
   <p:sldMasterIdLst>
     <p:sldMasterId id="2147483648" r:id="rId1"/>
   </p:sldMasterIdLst>
+  <p:notesMasterIdLst>
+    <p:notesMasterId r:id="rId7"/>
+  </p:notesMasterIdLst>
   <p:sldIdLst>
     <p:sldId id="327" r:id="rId2"/>
     <p:sldId id="328" r:id="rId3"/>
     <p:sldId id="331" r:id="rId4"/>
     <p:sldId id="332" r:id="rId5"/>
-    <p:sldId id="329" r:id="rId6"/>
+    <p:sldId id="333" r:id="rId6"/>
   </p:sldIdLst>
   <p:sldSz cx="12192000" cy="6858000"/>
   <p:notesSz cx="6858000" cy="9144000"/>
@@ -109,6 +112,440 @@
     </a:lvl9pPr>
   </p:defaultTextStyle>
 </p:presentation>
+</file>
+
+<file path=ppt/notesMasters/notesMaster1.xml><?xml version="1.0" encoding="utf-8"?>
+<p:notesMaster xmlns:a="http://schemas.openxmlformats.org/drawingml/2006/main" xmlns:r="http://schemas.openxmlformats.org/officeDocument/2006/relationships" xmlns:p="http://schemas.openxmlformats.org/presentationml/2006/main">
+  <p:cSld>
+    <p:bg>
+      <p:bgRef idx="1001">
+        <a:schemeClr val="bg1"/>
+      </p:bgRef>
+    </p:bg>
+    <p:spTree>
+      <p:nvGrpSpPr>
+        <p:cNvPr id="1" name=""/>
+        <p:cNvGrpSpPr/>
+        <p:nvPr/>
+      </p:nvGrpSpPr>
+      <p:grpSpPr>
+        <a:xfrm>
+          <a:off x="0" y="0"/>
+          <a:ext cx="0" cy="0"/>
+          <a:chOff x="0" y="0"/>
+          <a:chExt cx="0" cy="0"/>
+        </a:xfrm>
+      </p:grpSpPr>
+      <p:sp>
+        <p:nvSpPr>
+          <p:cNvPr id="2" name="Header Placeholder 1"/>
+          <p:cNvSpPr>
+            <a:spLocks noGrp="1"/>
+          </p:cNvSpPr>
+          <p:nvPr>
+            <p:ph type="hdr" sz="quarter"/>
+          </p:nvPr>
+        </p:nvSpPr>
+        <p:spPr>
+          <a:xfrm>
+            <a:off x="0" y="0"/>
+            <a:ext cx="2971800" cy="458788"/>
+          </a:xfrm>
+          <a:prstGeom prst="rect">
+            <a:avLst/>
+          </a:prstGeom>
+        </p:spPr>
+        <p:txBody>
+          <a:bodyPr vert="horz" lIns="91440" tIns="45720" rIns="91440" bIns="45720" rtlCol="0"/>
+          <a:lstStyle>
+            <a:lvl1pPr algn="l">
+              <a:defRPr sz="1200"/>
+            </a:lvl1pPr>
+          </a:lstStyle>
+          <a:p>
+            <a:endParaRPr lang="en-US"/>
+          </a:p>
+        </p:txBody>
+      </p:sp>
+      <p:sp>
+        <p:nvSpPr>
+          <p:cNvPr id="3" name="Date Placeholder 2"/>
+          <p:cNvSpPr>
+            <a:spLocks noGrp="1"/>
+          </p:cNvSpPr>
+          <p:nvPr>
+            <p:ph type="dt" idx="1"/>
+          </p:nvPr>
+        </p:nvSpPr>
+        <p:spPr>
+          <a:xfrm>
+            <a:off x="3884613" y="0"/>
+            <a:ext cx="2971800" cy="458788"/>
+          </a:xfrm>
+          <a:prstGeom prst="rect">
+            <a:avLst/>
+          </a:prstGeom>
+        </p:spPr>
+        <p:txBody>
+          <a:bodyPr vert="horz" lIns="91440" tIns="45720" rIns="91440" bIns="45720" rtlCol="0"/>
+          <a:lstStyle>
+            <a:lvl1pPr algn="r">
+              <a:defRPr sz="1200"/>
+            </a:lvl1pPr>
+          </a:lstStyle>
+          <a:p>
+            <a:fld id="{13500C3F-41E8-2441-BE57-617767F3F9CE}" type="datetimeFigureOut">
+              <a:rPr lang="en-US" smtClean="0"/>
+              <a:t>11/30/21</a:t>
+            </a:fld>
+            <a:endParaRPr lang="en-US"/>
+          </a:p>
+        </p:txBody>
+      </p:sp>
+      <p:sp>
+        <p:nvSpPr>
+          <p:cNvPr id="4" name="Slide Image Placeholder 3"/>
+          <p:cNvSpPr>
+            <a:spLocks noGrp="1" noRot="1" noChangeAspect="1"/>
+          </p:cNvSpPr>
+          <p:nvPr>
+            <p:ph type="sldImg" idx="2"/>
+          </p:nvPr>
+        </p:nvSpPr>
+        <p:spPr>
+          <a:xfrm>
+            <a:off x="685800" y="1143000"/>
+            <a:ext cx="5486400" cy="3086100"/>
+          </a:xfrm>
+          <a:prstGeom prst="rect">
+            <a:avLst/>
+          </a:prstGeom>
+          <a:noFill/>
+          <a:ln w="12700">
+            <a:solidFill>
+              <a:prstClr val="black"/>
+            </a:solidFill>
+          </a:ln>
+        </p:spPr>
+        <p:txBody>
+          <a:bodyPr vert="horz" lIns="91440" tIns="45720" rIns="91440" bIns="45720" rtlCol="0" anchor="ctr"/>
+          <a:lstStyle/>
+          <a:p>
+            <a:endParaRPr lang="en-US"/>
+          </a:p>
+        </p:txBody>
+      </p:sp>
+      <p:sp>
+        <p:nvSpPr>
+          <p:cNvPr id="5" name="Notes Placeholder 4"/>
+          <p:cNvSpPr>
+            <a:spLocks noGrp="1"/>
+          </p:cNvSpPr>
+          <p:nvPr>
+            <p:ph type="body" sz="quarter" idx="3"/>
+          </p:nvPr>
+        </p:nvSpPr>
+        <p:spPr>
+          <a:xfrm>
+            <a:off x="685800" y="4400550"/>
+            <a:ext cx="5486400" cy="3600450"/>
+          </a:xfrm>
+          <a:prstGeom prst="rect">
+            <a:avLst/>
+          </a:prstGeom>
+        </p:spPr>
+        <p:txBody>
+          <a:bodyPr vert="horz" lIns="91440" tIns="45720" rIns="91440" bIns="45720" rtlCol="0"/>
+          <a:lstStyle/>
+          <a:p>
+            <a:pPr lvl="0"/>
+            <a:r>
+              <a:rPr lang="en-GB"/>
+              <a:t>Click to edit Master text styles</a:t>
+            </a:r>
+          </a:p>
+          <a:p>
+            <a:pPr lvl="1"/>
+            <a:r>
+              <a:rPr lang="en-GB"/>
+              <a:t>Second level</a:t>
+            </a:r>
+          </a:p>
+          <a:p>
+            <a:pPr lvl="2"/>
+            <a:r>
+              <a:rPr lang="en-GB"/>
+              <a:t>Third level</a:t>
+            </a:r>
+          </a:p>
+          <a:p>
+            <a:pPr lvl="3"/>
+            <a:r>
+              <a:rPr lang="en-GB"/>
+              <a:t>Fourth level</a:t>
+            </a:r>
+          </a:p>
+          <a:p>
+            <a:pPr lvl="4"/>
+            <a:r>
+              <a:rPr lang="en-GB"/>
+              <a:t>Fifth level</a:t>
+            </a:r>
+            <a:endParaRPr lang="en-US"/>
+          </a:p>
+        </p:txBody>
+      </p:sp>
+      <p:sp>
+        <p:nvSpPr>
+          <p:cNvPr id="6" name="Footer Placeholder 5"/>
+          <p:cNvSpPr>
+            <a:spLocks noGrp="1"/>
+          </p:cNvSpPr>
+          <p:nvPr>
+            <p:ph type="ftr" sz="quarter" idx="4"/>
+          </p:nvPr>
+        </p:nvSpPr>
+        <p:spPr>
+          <a:xfrm>
+            <a:off x="0" y="8685213"/>
+            <a:ext cx="2971800" cy="458787"/>
+          </a:xfrm>
+          <a:prstGeom prst="rect">
+            <a:avLst/>
+          </a:prstGeom>
+        </p:spPr>
+        <p:txBody>
+          <a:bodyPr vert="horz" lIns="91440" tIns="45720" rIns="91440" bIns="45720" rtlCol="0" anchor="b"/>
+          <a:lstStyle>
+            <a:lvl1pPr algn="l">
+              <a:defRPr sz="1200"/>
+            </a:lvl1pPr>
+          </a:lstStyle>
+          <a:p>
+            <a:endParaRPr lang="en-US"/>
+          </a:p>
+        </p:txBody>
+      </p:sp>
+      <p:sp>
+        <p:nvSpPr>
+          <p:cNvPr id="7" name="Slide Number Placeholder 6"/>
+          <p:cNvSpPr>
+            <a:spLocks noGrp="1"/>
+          </p:cNvSpPr>
+          <p:nvPr>
+            <p:ph type="sldNum" sz="quarter" idx="5"/>
+          </p:nvPr>
+        </p:nvSpPr>
+        <p:spPr>
+          <a:xfrm>
+            <a:off x="3884613" y="8685213"/>
+            <a:ext cx="2971800" cy="458787"/>
+          </a:xfrm>
+          <a:prstGeom prst="rect">
+            <a:avLst/>
+          </a:prstGeom>
+        </p:spPr>
+        <p:txBody>
+          <a:bodyPr vert="horz" lIns="91440" tIns="45720" rIns="91440" bIns="45720" rtlCol="0" anchor="b"/>
+          <a:lstStyle>
+            <a:lvl1pPr algn="r">
+              <a:defRPr sz="1200"/>
+            </a:lvl1pPr>
+          </a:lstStyle>
+          <a:p>
+            <a:fld id="{0AE1B4E1-B550-414F-96E9-0DCAB06AB7AF}" type="slidenum">
+              <a:rPr lang="en-US" smtClean="0"/>
+              <a:t>‹#›</a:t>
+            </a:fld>
+            <a:endParaRPr lang="en-US"/>
+          </a:p>
+        </p:txBody>
+      </p:sp>
+    </p:spTree>
+    <p:extLst>
+      <p:ext uri="{BB962C8B-B14F-4D97-AF65-F5344CB8AC3E}">
+        <p14:creationId xmlns:p14="http://schemas.microsoft.com/office/powerpoint/2010/main" val="47909210"/>
+      </p:ext>
+    </p:extLst>
+  </p:cSld>
+  <p:clrMap bg1="lt1" tx1="dk1" bg2="lt2" tx2="dk2" accent1="accent1" accent2="accent2" accent3="accent3" accent4="accent4" accent5="accent5" accent6="accent6" hlink="hlink" folHlink="folHlink"/>
+  <p:notesStyle>
+    <a:lvl1pPr marL="0" algn="l" defTabSz="914400" rtl="0" eaLnBrk="1" latinLnBrk="0" hangingPunct="1">
+      <a:defRPr sz="1200" kern="1200">
+        <a:solidFill>
+          <a:schemeClr val="tx1"/>
+        </a:solidFill>
+        <a:latin typeface="+mn-lt"/>
+        <a:ea typeface="+mn-ea"/>
+        <a:cs typeface="+mn-cs"/>
+      </a:defRPr>
+    </a:lvl1pPr>
+    <a:lvl2pPr marL="457200" algn="l" defTabSz="914400" rtl="0" eaLnBrk="1" latinLnBrk="0" hangingPunct="1">
+      <a:defRPr sz="1200" kern="1200">
+        <a:solidFill>
+          <a:schemeClr val="tx1"/>
+        </a:solidFill>
+        <a:latin typeface="+mn-lt"/>
+        <a:ea typeface="+mn-ea"/>
+        <a:cs typeface="+mn-cs"/>
+      </a:defRPr>
+    </a:lvl2pPr>
+    <a:lvl3pPr marL="914400" algn="l" defTabSz="914400" rtl="0" eaLnBrk="1" latinLnBrk="0" hangingPunct="1">
+      <a:defRPr sz="1200" kern="1200">
+        <a:solidFill>
+          <a:schemeClr val="tx1"/>
+        </a:solidFill>
+        <a:latin typeface="+mn-lt"/>
+        <a:ea typeface="+mn-ea"/>
+        <a:cs typeface="+mn-cs"/>
+      </a:defRPr>
+    </a:lvl3pPr>
+    <a:lvl4pPr marL="1371600" algn="l" defTabSz="914400" rtl="0" eaLnBrk="1" latinLnBrk="0" hangingPunct="1">
+      <a:defRPr sz="1200" kern="1200">
+        <a:solidFill>
+          <a:schemeClr val="tx1"/>
+        </a:solidFill>
+        <a:latin typeface="+mn-lt"/>
+        <a:ea typeface="+mn-ea"/>
+        <a:cs typeface="+mn-cs"/>
+      </a:defRPr>
+    </a:lvl4pPr>
+    <a:lvl5pPr marL="1828800" algn="l" defTabSz="914400" rtl="0" eaLnBrk="1" latinLnBrk="0" hangingPunct="1">
+      <a:defRPr sz="1200" kern="1200">
+        <a:solidFill>
+          <a:schemeClr val="tx1"/>
+        </a:solidFill>
+        <a:latin typeface="+mn-lt"/>
+        <a:ea typeface="+mn-ea"/>
+        <a:cs typeface="+mn-cs"/>
+      </a:defRPr>
+    </a:lvl5pPr>
+    <a:lvl6pPr marL="2286000" algn="l" defTabSz="914400" rtl="0" eaLnBrk="1" latinLnBrk="0" hangingPunct="1">
+      <a:defRPr sz="1200" kern="1200">
+        <a:solidFill>
+          <a:schemeClr val="tx1"/>
+        </a:solidFill>
+        <a:latin typeface="+mn-lt"/>
+        <a:ea typeface="+mn-ea"/>
+        <a:cs typeface="+mn-cs"/>
+      </a:defRPr>
+    </a:lvl6pPr>
+    <a:lvl7pPr marL="2743200" algn="l" defTabSz="914400" rtl="0" eaLnBrk="1" latinLnBrk="0" hangingPunct="1">
+      <a:defRPr sz="1200" kern="1200">
+        <a:solidFill>
+          <a:schemeClr val="tx1"/>
+        </a:solidFill>
+        <a:latin typeface="+mn-lt"/>
+        <a:ea typeface="+mn-ea"/>
+        <a:cs typeface="+mn-cs"/>
+      </a:defRPr>
+    </a:lvl7pPr>
+    <a:lvl8pPr marL="3200400" algn="l" defTabSz="914400" rtl="0" eaLnBrk="1" latinLnBrk="0" hangingPunct="1">
+      <a:defRPr sz="1200" kern="1200">
+        <a:solidFill>
+          <a:schemeClr val="tx1"/>
+        </a:solidFill>
+        <a:latin typeface="+mn-lt"/>
+        <a:ea typeface="+mn-ea"/>
+        <a:cs typeface="+mn-cs"/>
+      </a:defRPr>
+    </a:lvl8pPr>
+    <a:lvl9pPr marL="3657600" algn="l" defTabSz="914400" rtl="0" eaLnBrk="1" latinLnBrk="0" hangingPunct="1">
+      <a:defRPr sz="1200" kern="1200">
+        <a:solidFill>
+          <a:schemeClr val="tx1"/>
+        </a:solidFill>
+        <a:latin typeface="+mn-lt"/>
+        <a:ea typeface="+mn-ea"/>
+        <a:cs typeface="+mn-cs"/>
+      </a:defRPr>
+    </a:lvl9pPr>
+  </p:notesStyle>
+</p:notesMaster>
+</file>
+
+<file path=ppt/notesSlides/notesSlide1.xml><?xml version="1.0" encoding="utf-8"?>
+<p:notes xmlns:a="http://schemas.openxmlformats.org/drawingml/2006/main" xmlns:r="http://schemas.openxmlformats.org/officeDocument/2006/relationships" xmlns:p="http://schemas.openxmlformats.org/presentationml/2006/main">
+  <p:cSld>
+    <p:spTree>
+      <p:nvGrpSpPr>
+        <p:cNvPr id="1" name=""/>
+        <p:cNvGrpSpPr/>
+        <p:nvPr/>
+      </p:nvGrpSpPr>
+      <p:grpSpPr>
+        <a:xfrm>
+          <a:off x="0" y="0"/>
+          <a:ext cx="0" cy="0"/>
+          <a:chOff x="0" y="0"/>
+          <a:chExt cx="0" cy="0"/>
+        </a:xfrm>
+      </p:grpSpPr>
+      <p:sp>
+        <p:nvSpPr>
+          <p:cNvPr id="2" name="Slide Image Placeholder 1"/>
+          <p:cNvSpPr>
+            <a:spLocks noGrp="1" noRot="1" noChangeAspect="1"/>
+          </p:cNvSpPr>
+          <p:nvPr>
+            <p:ph type="sldImg"/>
+          </p:nvPr>
+        </p:nvSpPr>
+        <p:spPr/>
+      </p:sp>
+      <p:sp>
+        <p:nvSpPr>
+          <p:cNvPr id="3" name="Notes Placeholder 2"/>
+          <p:cNvSpPr>
+            <a:spLocks noGrp="1"/>
+          </p:cNvSpPr>
+          <p:nvPr>
+            <p:ph type="body" idx="1"/>
+          </p:nvPr>
+        </p:nvSpPr>
+        <p:spPr/>
+        <p:txBody>
+          <a:bodyPr/>
+          <a:lstStyle/>
+          <a:p>
+            <a:endParaRPr lang="en-US" dirty="0"/>
+          </a:p>
+        </p:txBody>
+      </p:sp>
+      <p:sp>
+        <p:nvSpPr>
+          <p:cNvPr id="4" name="Slide Number Placeholder 3"/>
+          <p:cNvSpPr>
+            <a:spLocks noGrp="1"/>
+          </p:cNvSpPr>
+          <p:nvPr>
+            <p:ph type="sldNum" sz="quarter" idx="5"/>
+          </p:nvPr>
+        </p:nvSpPr>
+        <p:spPr/>
+        <p:txBody>
+          <a:bodyPr/>
+          <a:lstStyle/>
+          <a:p>
+            <a:fld id="{0AE1B4E1-B550-414F-96E9-0DCAB06AB7AF}" type="slidenum">
+              <a:rPr lang="en-US" smtClean="0"/>
+              <a:t>5</a:t>
+            </a:fld>
+            <a:endParaRPr lang="en-US"/>
+          </a:p>
+        </p:txBody>
+      </p:sp>
+    </p:spTree>
+    <p:extLst>
+      <p:ext uri="{BB962C8B-B14F-4D97-AF65-F5344CB8AC3E}">
+        <p14:creationId xmlns:p14="http://schemas.microsoft.com/office/powerpoint/2010/main" val="1673618658"/>
+      </p:ext>
+    </p:extLst>
+  </p:cSld>
+  <p:clrMapOvr>
+    <a:masterClrMapping/>
+  </p:clrMapOvr>
+</p:notes>
 </file>
 
 <file path=ppt/slideLayouts/slideLayout1.xml><?xml version="1.0" encoding="utf-8"?>
@@ -6126,7 +6563,7 @@
         </p:nvSpPr>
         <p:spPr>
           <a:xfrm>
-            <a:off x="4924097" y="2350432"/>
+            <a:off x="4934607" y="3003509"/>
             <a:ext cx="2301766" cy="567558"/>
           </a:xfrm>
           <a:prstGeom prst="rect">
@@ -7543,10 +7980,2441 @@
           <a:chExt cx="0" cy="0"/>
         </a:xfrm>
       </p:grpSpPr>
+      <p:sp>
+        <p:nvSpPr>
+          <p:cNvPr id="2" name="TextBox 1">
+            <a:extLst>
+              <a:ext uri="{FF2B5EF4-FFF2-40B4-BE49-F238E27FC236}">
+                <a16:creationId xmlns:a16="http://schemas.microsoft.com/office/drawing/2014/main" id="{C664AF3D-F6E0-5445-B4F0-0DDA59C470A0}"/>
+              </a:ext>
+            </a:extLst>
+          </p:cNvPr>
+          <p:cNvSpPr txBox="1"/>
+          <p:nvPr/>
+        </p:nvSpPr>
+        <p:spPr>
+          <a:xfrm>
+            <a:off x="1872537" y="333801"/>
+            <a:ext cx="8446926" cy="707886"/>
+          </a:xfrm>
+          <a:prstGeom prst="rect">
+            <a:avLst/>
+          </a:prstGeom>
+          <a:noFill/>
+        </p:spPr>
+        <p:txBody>
+          <a:bodyPr wrap="square" rtlCol="0">
+            <a:spAutoFit/>
+          </a:bodyPr>
+          <a:lstStyle/>
+          <a:p>
+            <a:pPr algn="ctr"/>
+            <a:r>
+              <a:rPr lang="en-US" sz="4000" dirty="0">
+                <a:solidFill>
+                  <a:schemeClr val="accent1">
+                    <a:lumMod val="60000"/>
+                    <a:lumOff val="40000"/>
+                  </a:schemeClr>
+                </a:solidFill>
+              </a:rPr>
+              <a:t>Class</a:t>
+            </a:r>
+          </a:p>
+        </p:txBody>
+      </p:sp>
+      <p:sp>
+        <p:nvSpPr>
+          <p:cNvPr id="3" name="Rectangle 2">
+            <a:extLst>
+              <a:ext uri="{FF2B5EF4-FFF2-40B4-BE49-F238E27FC236}">
+                <a16:creationId xmlns:a16="http://schemas.microsoft.com/office/drawing/2014/main" id="{18C4A6D6-886E-5C42-B92C-3F1480A9C6D1}"/>
+              </a:ext>
+            </a:extLst>
+          </p:cNvPr>
+          <p:cNvSpPr/>
+          <p:nvPr/>
+        </p:nvSpPr>
+        <p:spPr>
+          <a:xfrm>
+            <a:off x="8676290" y="632652"/>
+            <a:ext cx="2301766" cy="2585545"/>
+          </a:xfrm>
+          <a:prstGeom prst="rect">
+            <a:avLst/>
+          </a:prstGeom>
+          <a:solidFill>
+            <a:schemeClr val="bg2"/>
+          </a:solidFill>
+        </p:spPr>
+        <p:style>
+          <a:lnRef idx="2">
+            <a:schemeClr val="accent1">
+              <a:shade val="50000"/>
+            </a:schemeClr>
+          </a:lnRef>
+          <a:fillRef idx="1">
+            <a:schemeClr val="accent1"/>
+          </a:fillRef>
+          <a:effectRef idx="0">
+            <a:schemeClr val="accent1"/>
+          </a:effectRef>
+          <a:fontRef idx="minor">
+            <a:schemeClr val="lt1"/>
+          </a:fontRef>
+        </p:style>
+        <p:txBody>
+          <a:bodyPr rtlCol="0" anchor="ctr"/>
+          <a:lstStyle/>
+          <a:p>
+            <a:pPr algn="ctr"/>
+            <a:endParaRPr lang="en-US" dirty="0"/>
+          </a:p>
+          <a:p>
+            <a:pPr algn="ctr"/>
+            <a:endParaRPr lang="en-US" dirty="0"/>
+          </a:p>
+        </p:txBody>
+      </p:sp>
+      <p:sp>
+        <p:nvSpPr>
+          <p:cNvPr id="4" name="TextBox 3">
+            <a:extLst>
+              <a:ext uri="{FF2B5EF4-FFF2-40B4-BE49-F238E27FC236}">
+                <a16:creationId xmlns:a16="http://schemas.microsoft.com/office/drawing/2014/main" id="{A55DC47E-F27A-AC4D-BE7D-B7AA15C06DE5}"/>
+              </a:ext>
+            </a:extLst>
+          </p:cNvPr>
+          <p:cNvSpPr txBox="1"/>
+          <p:nvPr/>
+        </p:nvSpPr>
+        <p:spPr>
+          <a:xfrm>
+            <a:off x="8676290" y="566077"/>
+            <a:ext cx="2301766" cy="461665"/>
+          </a:xfrm>
+          <a:prstGeom prst="rect">
+            <a:avLst/>
+          </a:prstGeom>
+          <a:noFill/>
+        </p:spPr>
+        <p:txBody>
+          <a:bodyPr wrap="square" rtlCol="0">
+            <a:spAutoFit/>
+          </a:bodyPr>
+          <a:lstStyle/>
+          <a:p>
+            <a:pPr algn="ctr"/>
+            <a:r>
+              <a:rPr lang="en-US" sz="2400" dirty="0">
+                <a:solidFill>
+                  <a:schemeClr val="accent4">
+                    <a:lumMod val="40000"/>
+                    <a:lumOff val="60000"/>
+                  </a:schemeClr>
+                </a:solidFill>
+              </a:rPr>
+              <a:t>Function</a:t>
+            </a:r>
+          </a:p>
+        </p:txBody>
+      </p:sp>
+      <p:sp>
+        <p:nvSpPr>
+          <p:cNvPr id="5" name="Rectangle 4">
+            <a:extLst>
+              <a:ext uri="{FF2B5EF4-FFF2-40B4-BE49-F238E27FC236}">
+                <a16:creationId xmlns:a16="http://schemas.microsoft.com/office/drawing/2014/main" id="{48EFF5D7-DDE6-0242-94DA-3CE9B1C35554}"/>
+              </a:ext>
+            </a:extLst>
+          </p:cNvPr>
+          <p:cNvSpPr/>
+          <p:nvPr/>
+        </p:nvSpPr>
+        <p:spPr>
+          <a:xfrm>
+            <a:off x="8676290" y="933428"/>
+            <a:ext cx="2301766" cy="255790"/>
+          </a:xfrm>
+          <a:prstGeom prst="rect">
+            <a:avLst/>
+          </a:prstGeom>
+          <a:solidFill>
+            <a:schemeClr val="accent4">
+              <a:lumMod val="60000"/>
+              <a:lumOff val="40000"/>
+            </a:schemeClr>
+          </a:solidFill>
+        </p:spPr>
+        <p:style>
+          <a:lnRef idx="2">
+            <a:schemeClr val="accent1">
+              <a:shade val="50000"/>
+            </a:schemeClr>
+          </a:lnRef>
+          <a:fillRef idx="1">
+            <a:schemeClr val="accent1"/>
+          </a:fillRef>
+          <a:effectRef idx="0">
+            <a:schemeClr val="accent1"/>
+          </a:effectRef>
+          <a:fontRef idx="minor">
+            <a:schemeClr val="lt1"/>
+          </a:fontRef>
+        </p:style>
+        <p:txBody>
+          <a:bodyPr rtlCol="0" anchor="ctr"/>
+          <a:lstStyle/>
+          <a:p>
+            <a:pPr algn="ctr"/>
+            <a:r>
+              <a:rPr lang="en-US" dirty="0">
+                <a:solidFill>
+                  <a:schemeClr val="accent5"/>
+                </a:solidFill>
+              </a:rPr>
+              <a:t>Function.prototype</a:t>
+            </a:r>
+          </a:p>
+        </p:txBody>
+      </p:sp>
+      <p:sp>
+        <p:nvSpPr>
+          <p:cNvPr id="6" name="Rectangle 5">
+            <a:extLst>
+              <a:ext uri="{FF2B5EF4-FFF2-40B4-BE49-F238E27FC236}">
+                <a16:creationId xmlns:a16="http://schemas.microsoft.com/office/drawing/2014/main" id="{37FF3FD9-51F6-AD41-B879-E11B4E136F12}"/>
+              </a:ext>
+            </a:extLst>
+          </p:cNvPr>
+          <p:cNvSpPr/>
+          <p:nvPr/>
+        </p:nvSpPr>
+        <p:spPr>
+          <a:xfrm>
+            <a:off x="8676290" y="2233693"/>
+            <a:ext cx="2301766" cy="522890"/>
+          </a:xfrm>
+          <a:prstGeom prst="rect">
+            <a:avLst/>
+          </a:prstGeom>
+        </p:spPr>
+        <p:style>
+          <a:lnRef idx="2">
+            <a:schemeClr val="accent1">
+              <a:shade val="50000"/>
+            </a:schemeClr>
+          </a:lnRef>
+          <a:fillRef idx="1">
+            <a:schemeClr val="accent1"/>
+          </a:fillRef>
+          <a:effectRef idx="0">
+            <a:schemeClr val="accent1"/>
+          </a:effectRef>
+          <a:fontRef idx="minor">
+            <a:schemeClr val="lt1"/>
+          </a:fontRef>
+        </p:style>
+        <p:txBody>
+          <a:bodyPr rtlCol="0" anchor="ctr"/>
+          <a:lstStyle/>
+          <a:p>
+            <a:pPr algn="ctr"/>
+            <a:r>
+              <a:rPr lang="en-US" dirty="0"/>
+              <a:t>__proto__</a:t>
+            </a:r>
+          </a:p>
+        </p:txBody>
+      </p:sp>
+      <p:sp>
+        <p:nvSpPr>
+          <p:cNvPr id="7" name="Rectangle 6">
+            <a:extLst>
+              <a:ext uri="{FF2B5EF4-FFF2-40B4-BE49-F238E27FC236}">
+                <a16:creationId xmlns:a16="http://schemas.microsoft.com/office/drawing/2014/main" id="{C0AE5EB4-74DA-6C45-B1AC-71AFBBFB2072}"/>
+              </a:ext>
+            </a:extLst>
+          </p:cNvPr>
+          <p:cNvSpPr/>
+          <p:nvPr/>
+        </p:nvSpPr>
+        <p:spPr>
+          <a:xfrm>
+            <a:off x="8676290" y="1714255"/>
+            <a:ext cx="2301766" cy="567558"/>
+          </a:xfrm>
+          <a:prstGeom prst="rect">
+            <a:avLst/>
+          </a:prstGeom>
+        </p:spPr>
+        <p:style>
+          <a:lnRef idx="2">
+            <a:schemeClr val="accent1">
+              <a:shade val="50000"/>
+            </a:schemeClr>
+          </a:lnRef>
+          <a:fillRef idx="1">
+            <a:schemeClr val="accent1"/>
+          </a:fillRef>
+          <a:effectRef idx="0">
+            <a:schemeClr val="accent1"/>
+          </a:effectRef>
+          <a:fontRef idx="minor">
+            <a:schemeClr val="lt1"/>
+          </a:fontRef>
+        </p:style>
+        <p:txBody>
+          <a:bodyPr rtlCol="0" anchor="ctr"/>
+          <a:lstStyle/>
+          <a:p>
+            <a:pPr algn="ctr"/>
+            <a:r>
+              <a:rPr lang="en-US" dirty="0"/>
+              <a:t>Properties</a:t>
+            </a:r>
+          </a:p>
+        </p:txBody>
+      </p:sp>
+      <p:sp>
+        <p:nvSpPr>
+          <p:cNvPr id="8" name="Rectangle 7">
+            <a:extLst>
+              <a:ext uri="{FF2B5EF4-FFF2-40B4-BE49-F238E27FC236}">
+                <a16:creationId xmlns:a16="http://schemas.microsoft.com/office/drawing/2014/main" id="{30B32973-2BEE-A849-A1CA-04BB1CFB8B23}"/>
+              </a:ext>
+            </a:extLst>
+          </p:cNvPr>
+          <p:cNvSpPr/>
+          <p:nvPr/>
+        </p:nvSpPr>
+        <p:spPr>
+          <a:xfrm>
+            <a:off x="8676290" y="3642087"/>
+            <a:ext cx="2301766" cy="2585545"/>
+          </a:xfrm>
+          <a:prstGeom prst="rect">
+            <a:avLst/>
+          </a:prstGeom>
+          <a:solidFill>
+            <a:schemeClr val="bg2"/>
+          </a:solidFill>
+        </p:spPr>
+        <p:style>
+          <a:lnRef idx="2">
+            <a:schemeClr val="accent1">
+              <a:shade val="50000"/>
+            </a:schemeClr>
+          </a:lnRef>
+          <a:fillRef idx="1">
+            <a:schemeClr val="accent1"/>
+          </a:fillRef>
+          <a:effectRef idx="0">
+            <a:schemeClr val="accent1"/>
+          </a:effectRef>
+          <a:fontRef idx="minor">
+            <a:schemeClr val="lt1"/>
+          </a:fontRef>
+        </p:style>
+        <p:txBody>
+          <a:bodyPr rtlCol="0" anchor="ctr"/>
+          <a:lstStyle/>
+          <a:p>
+            <a:pPr algn="ctr"/>
+            <a:endParaRPr lang="en-US" dirty="0"/>
+          </a:p>
+          <a:p>
+            <a:pPr algn="ctr"/>
+            <a:endParaRPr lang="en-US" dirty="0"/>
+          </a:p>
+        </p:txBody>
+      </p:sp>
+      <p:sp>
+        <p:nvSpPr>
+          <p:cNvPr id="9" name="TextBox 8">
+            <a:extLst>
+              <a:ext uri="{FF2B5EF4-FFF2-40B4-BE49-F238E27FC236}">
+                <a16:creationId xmlns:a16="http://schemas.microsoft.com/office/drawing/2014/main" id="{52538BB2-211B-FE45-B84D-A49483EA58E3}"/>
+              </a:ext>
+            </a:extLst>
+          </p:cNvPr>
+          <p:cNvSpPr txBox="1"/>
+          <p:nvPr/>
+        </p:nvSpPr>
+        <p:spPr>
+          <a:xfrm>
+            <a:off x="8676290" y="3575512"/>
+            <a:ext cx="2301766" cy="461665"/>
+          </a:xfrm>
+          <a:prstGeom prst="rect">
+            <a:avLst/>
+          </a:prstGeom>
+          <a:noFill/>
+        </p:spPr>
+        <p:txBody>
+          <a:bodyPr wrap="square" rtlCol="0">
+            <a:spAutoFit/>
+          </a:bodyPr>
+          <a:lstStyle/>
+          <a:p>
+            <a:pPr algn="ctr"/>
+            <a:r>
+              <a:rPr lang="en-US" sz="2400" dirty="0">
+                <a:solidFill>
+                  <a:schemeClr val="accent4">
+                    <a:lumMod val="40000"/>
+                    <a:lumOff val="60000"/>
+                  </a:schemeClr>
+                </a:solidFill>
+              </a:rPr>
+              <a:t>Object</a:t>
+            </a:r>
+          </a:p>
+        </p:txBody>
+      </p:sp>
+      <p:sp>
+        <p:nvSpPr>
+          <p:cNvPr id="10" name="Rectangle 9">
+            <a:extLst>
+              <a:ext uri="{FF2B5EF4-FFF2-40B4-BE49-F238E27FC236}">
+                <a16:creationId xmlns:a16="http://schemas.microsoft.com/office/drawing/2014/main" id="{0F46C047-C1DF-474A-8C5C-65E53002F667}"/>
+              </a:ext>
+            </a:extLst>
+          </p:cNvPr>
+          <p:cNvSpPr/>
+          <p:nvPr/>
+        </p:nvSpPr>
+        <p:spPr>
+          <a:xfrm>
+            <a:off x="8676290" y="3975857"/>
+            <a:ext cx="2301766" cy="255790"/>
+          </a:xfrm>
+          <a:prstGeom prst="rect">
+            <a:avLst/>
+          </a:prstGeom>
+          <a:solidFill>
+            <a:schemeClr val="accent4">
+              <a:lumMod val="60000"/>
+              <a:lumOff val="40000"/>
+            </a:schemeClr>
+          </a:solidFill>
+        </p:spPr>
+        <p:style>
+          <a:lnRef idx="2">
+            <a:schemeClr val="accent1">
+              <a:shade val="50000"/>
+            </a:schemeClr>
+          </a:lnRef>
+          <a:fillRef idx="1">
+            <a:schemeClr val="accent1"/>
+          </a:fillRef>
+          <a:effectRef idx="0">
+            <a:schemeClr val="accent1"/>
+          </a:effectRef>
+          <a:fontRef idx="minor">
+            <a:schemeClr val="lt1"/>
+          </a:fontRef>
+        </p:style>
+        <p:txBody>
+          <a:bodyPr rtlCol="0" anchor="ctr"/>
+          <a:lstStyle/>
+          <a:p>
+            <a:pPr algn="ctr"/>
+            <a:r>
+              <a:rPr lang="en-US" dirty="0">
+                <a:solidFill>
+                  <a:schemeClr val="accent5"/>
+                </a:solidFill>
+              </a:rPr>
+              <a:t>Function.prototype</a:t>
+            </a:r>
+          </a:p>
+        </p:txBody>
+      </p:sp>
+      <p:sp>
+        <p:nvSpPr>
+          <p:cNvPr id="11" name="Rectangle 10">
+            <a:extLst>
+              <a:ext uri="{FF2B5EF4-FFF2-40B4-BE49-F238E27FC236}">
+                <a16:creationId xmlns:a16="http://schemas.microsoft.com/office/drawing/2014/main" id="{49A69D23-353D-3149-994C-58EF7895EC7A}"/>
+              </a:ext>
+            </a:extLst>
+          </p:cNvPr>
+          <p:cNvSpPr/>
+          <p:nvPr/>
+        </p:nvSpPr>
+        <p:spPr>
+          <a:xfrm>
+            <a:off x="8676290" y="5357823"/>
+            <a:ext cx="2301766" cy="522890"/>
+          </a:xfrm>
+          <a:prstGeom prst="rect">
+            <a:avLst/>
+          </a:prstGeom>
+        </p:spPr>
+        <p:style>
+          <a:lnRef idx="2">
+            <a:schemeClr val="accent1">
+              <a:shade val="50000"/>
+            </a:schemeClr>
+          </a:lnRef>
+          <a:fillRef idx="1">
+            <a:schemeClr val="accent1"/>
+          </a:fillRef>
+          <a:effectRef idx="0">
+            <a:schemeClr val="accent1"/>
+          </a:effectRef>
+          <a:fontRef idx="minor">
+            <a:schemeClr val="lt1"/>
+          </a:fontRef>
+        </p:style>
+        <p:txBody>
+          <a:bodyPr rtlCol="0" anchor="ctr"/>
+          <a:lstStyle/>
+          <a:p>
+            <a:pPr algn="ctr"/>
+            <a:r>
+              <a:rPr lang="en-US" dirty="0"/>
+              <a:t>__proto__</a:t>
+            </a:r>
+          </a:p>
+        </p:txBody>
+      </p:sp>
+      <p:sp>
+        <p:nvSpPr>
+          <p:cNvPr id="12" name="Rectangle 11">
+            <a:extLst>
+              <a:ext uri="{FF2B5EF4-FFF2-40B4-BE49-F238E27FC236}">
+                <a16:creationId xmlns:a16="http://schemas.microsoft.com/office/drawing/2014/main" id="{5B762186-48BE-3B48-BC10-727E8546CB28}"/>
+              </a:ext>
+            </a:extLst>
+          </p:cNvPr>
+          <p:cNvSpPr/>
+          <p:nvPr/>
+        </p:nvSpPr>
+        <p:spPr>
+          <a:xfrm>
+            <a:off x="8676290" y="4868984"/>
+            <a:ext cx="2301766" cy="567558"/>
+          </a:xfrm>
+          <a:prstGeom prst="rect">
+            <a:avLst/>
+          </a:prstGeom>
+        </p:spPr>
+        <p:style>
+          <a:lnRef idx="2">
+            <a:schemeClr val="accent1">
+              <a:shade val="50000"/>
+            </a:schemeClr>
+          </a:lnRef>
+          <a:fillRef idx="1">
+            <a:schemeClr val="accent1"/>
+          </a:fillRef>
+          <a:effectRef idx="0">
+            <a:schemeClr val="accent1"/>
+          </a:effectRef>
+          <a:fontRef idx="minor">
+            <a:schemeClr val="lt1"/>
+          </a:fontRef>
+        </p:style>
+        <p:txBody>
+          <a:bodyPr rtlCol="0" anchor="ctr"/>
+          <a:lstStyle/>
+          <a:p>
+            <a:pPr algn="ctr"/>
+            <a:r>
+              <a:rPr lang="en-US" dirty="0"/>
+              <a:t>Properties</a:t>
+            </a:r>
+          </a:p>
+        </p:txBody>
+      </p:sp>
+      <p:sp>
+        <p:nvSpPr>
+          <p:cNvPr id="13" name="Rectangle 12">
+            <a:extLst>
+              <a:ext uri="{FF2B5EF4-FFF2-40B4-BE49-F238E27FC236}">
+                <a16:creationId xmlns:a16="http://schemas.microsoft.com/office/drawing/2014/main" id="{1795B559-B36F-A74D-AE79-656F9F9EA2FB}"/>
+              </a:ext>
+            </a:extLst>
+          </p:cNvPr>
+          <p:cNvSpPr/>
+          <p:nvPr/>
+        </p:nvSpPr>
+        <p:spPr>
+          <a:xfrm>
+            <a:off x="8676290" y="4262067"/>
+            <a:ext cx="2301766" cy="567558"/>
+          </a:xfrm>
+          <a:prstGeom prst="rect">
+            <a:avLst/>
+          </a:prstGeom>
+        </p:spPr>
+        <p:style>
+          <a:lnRef idx="2">
+            <a:schemeClr val="accent1">
+              <a:shade val="50000"/>
+            </a:schemeClr>
+          </a:lnRef>
+          <a:fillRef idx="1">
+            <a:schemeClr val="accent1"/>
+          </a:fillRef>
+          <a:effectRef idx="0">
+            <a:schemeClr val="accent1"/>
+          </a:effectRef>
+          <a:fontRef idx="minor">
+            <a:schemeClr val="lt1"/>
+          </a:fontRef>
+        </p:style>
+        <p:txBody>
+          <a:bodyPr rtlCol="0" anchor="ctr"/>
+          <a:lstStyle/>
+          <a:p>
+            <a:pPr algn="ctr"/>
+            <a:r>
+              <a:rPr lang="en-US" dirty="0"/>
+              <a:t>Methods</a:t>
+            </a:r>
+          </a:p>
+        </p:txBody>
+      </p:sp>
+      <p:sp>
+        <p:nvSpPr>
+          <p:cNvPr id="14" name="Rectangle 13">
+            <a:extLst>
+              <a:ext uri="{FF2B5EF4-FFF2-40B4-BE49-F238E27FC236}">
+                <a16:creationId xmlns:a16="http://schemas.microsoft.com/office/drawing/2014/main" id="{A0B5683A-1F2D-4644-8844-23A48885827B}"/>
+              </a:ext>
+            </a:extLst>
+          </p:cNvPr>
+          <p:cNvSpPr/>
+          <p:nvPr/>
+        </p:nvSpPr>
+        <p:spPr>
+          <a:xfrm>
+            <a:off x="9249104" y="6406338"/>
+            <a:ext cx="1156138" cy="301351"/>
+          </a:xfrm>
+          <a:prstGeom prst="rect">
+            <a:avLst/>
+          </a:prstGeom>
+        </p:spPr>
+        <p:style>
+          <a:lnRef idx="2">
+            <a:schemeClr val="accent1">
+              <a:shade val="50000"/>
+            </a:schemeClr>
+          </a:lnRef>
+          <a:fillRef idx="1">
+            <a:schemeClr val="accent1"/>
+          </a:fillRef>
+          <a:effectRef idx="0">
+            <a:schemeClr val="accent1"/>
+          </a:effectRef>
+          <a:fontRef idx="minor">
+            <a:schemeClr val="lt1"/>
+          </a:fontRef>
+        </p:style>
+        <p:txBody>
+          <a:bodyPr rtlCol="0" anchor="ctr"/>
+          <a:lstStyle/>
+          <a:p>
+            <a:pPr algn="ctr"/>
+            <a:r>
+              <a:rPr lang="en-US" dirty="0">
+                <a:solidFill>
+                  <a:schemeClr val="accent4">
+                    <a:lumMod val="40000"/>
+                    <a:lumOff val="60000"/>
+                  </a:schemeClr>
+                </a:solidFill>
+              </a:rPr>
+              <a:t>null</a:t>
+            </a:r>
+          </a:p>
+        </p:txBody>
+      </p:sp>
+      <p:sp>
+        <p:nvSpPr>
+          <p:cNvPr id="15" name="Rectangle 14">
+            <a:extLst>
+              <a:ext uri="{FF2B5EF4-FFF2-40B4-BE49-F238E27FC236}">
+                <a16:creationId xmlns:a16="http://schemas.microsoft.com/office/drawing/2014/main" id="{511773E9-9BD9-7049-8505-EA36B12874D7}"/>
+              </a:ext>
+            </a:extLst>
+          </p:cNvPr>
+          <p:cNvSpPr/>
+          <p:nvPr/>
+        </p:nvSpPr>
+        <p:spPr>
+          <a:xfrm>
+            <a:off x="4934608" y="2054000"/>
+            <a:ext cx="2301766" cy="2585545"/>
+          </a:xfrm>
+          <a:prstGeom prst="rect">
+            <a:avLst/>
+          </a:prstGeom>
+          <a:solidFill>
+            <a:schemeClr val="bg2"/>
+          </a:solidFill>
+        </p:spPr>
+        <p:style>
+          <a:lnRef idx="2">
+            <a:schemeClr val="accent1">
+              <a:shade val="50000"/>
+            </a:schemeClr>
+          </a:lnRef>
+          <a:fillRef idx="1">
+            <a:schemeClr val="accent1"/>
+          </a:fillRef>
+          <a:effectRef idx="0">
+            <a:schemeClr val="accent1"/>
+          </a:effectRef>
+          <a:fontRef idx="minor">
+            <a:schemeClr val="lt1"/>
+          </a:fontRef>
+        </p:style>
+        <p:txBody>
+          <a:bodyPr rtlCol="0" anchor="ctr"/>
+          <a:lstStyle/>
+          <a:p>
+            <a:pPr algn="ctr"/>
+            <a:endParaRPr lang="en-US" dirty="0"/>
+          </a:p>
+          <a:p>
+            <a:pPr algn="ctr"/>
+            <a:endParaRPr lang="en-US" dirty="0"/>
+          </a:p>
+        </p:txBody>
+      </p:sp>
+      <p:sp>
+        <p:nvSpPr>
+          <p:cNvPr id="16" name="TextBox 15">
+            <a:extLst>
+              <a:ext uri="{FF2B5EF4-FFF2-40B4-BE49-F238E27FC236}">
+                <a16:creationId xmlns:a16="http://schemas.microsoft.com/office/drawing/2014/main" id="{BF47A667-5244-A940-BFAD-BE7648A2E801}"/>
+              </a:ext>
+            </a:extLst>
+          </p:cNvPr>
+          <p:cNvSpPr txBox="1"/>
+          <p:nvPr/>
+        </p:nvSpPr>
+        <p:spPr>
+          <a:xfrm>
+            <a:off x="4934608" y="1987425"/>
+            <a:ext cx="2301766" cy="461665"/>
+          </a:xfrm>
+          <a:prstGeom prst="rect">
+            <a:avLst/>
+          </a:prstGeom>
+          <a:noFill/>
+        </p:spPr>
+        <p:txBody>
+          <a:bodyPr wrap="square" rtlCol="0">
+            <a:spAutoFit/>
+          </a:bodyPr>
+          <a:lstStyle/>
+          <a:p>
+            <a:pPr algn="ctr"/>
+            <a:r>
+              <a:rPr lang="en-US" sz="2400" dirty="0">
+                <a:solidFill>
+                  <a:schemeClr val="accent4">
+                    <a:lumMod val="40000"/>
+                    <a:lumOff val="60000"/>
+                  </a:schemeClr>
+                </a:solidFill>
+              </a:rPr>
+              <a:t>Letter</a:t>
+            </a:r>
+          </a:p>
+        </p:txBody>
+      </p:sp>
+      <p:sp>
+        <p:nvSpPr>
+          <p:cNvPr id="17" name="Rectangle 16">
+            <a:extLst>
+              <a:ext uri="{FF2B5EF4-FFF2-40B4-BE49-F238E27FC236}">
+                <a16:creationId xmlns:a16="http://schemas.microsoft.com/office/drawing/2014/main" id="{BA819834-2BF4-3C4D-A1CE-4EC867789A0F}"/>
+              </a:ext>
+            </a:extLst>
+          </p:cNvPr>
+          <p:cNvSpPr/>
+          <p:nvPr/>
+        </p:nvSpPr>
+        <p:spPr>
+          <a:xfrm>
+            <a:off x="4934608" y="2397343"/>
+            <a:ext cx="2301766" cy="255790"/>
+          </a:xfrm>
+          <a:prstGeom prst="rect">
+            <a:avLst/>
+          </a:prstGeom>
+          <a:solidFill>
+            <a:schemeClr val="accent4">
+              <a:lumMod val="60000"/>
+              <a:lumOff val="40000"/>
+            </a:schemeClr>
+          </a:solidFill>
+        </p:spPr>
+        <p:style>
+          <a:lnRef idx="2">
+            <a:schemeClr val="accent1">
+              <a:shade val="50000"/>
+            </a:schemeClr>
+          </a:lnRef>
+          <a:fillRef idx="1">
+            <a:schemeClr val="accent1"/>
+          </a:fillRef>
+          <a:effectRef idx="0">
+            <a:schemeClr val="accent1"/>
+          </a:effectRef>
+          <a:fontRef idx="minor">
+            <a:schemeClr val="lt1"/>
+          </a:fontRef>
+        </p:style>
+        <p:txBody>
+          <a:bodyPr rtlCol="0" anchor="ctr"/>
+          <a:lstStyle/>
+          <a:p>
+            <a:pPr algn="ctr"/>
+            <a:r>
+              <a:rPr lang="en-US" dirty="0">
+                <a:solidFill>
+                  <a:schemeClr val="accent5"/>
+                </a:solidFill>
+              </a:rPr>
+              <a:t>Letter.prototype</a:t>
+            </a:r>
+          </a:p>
+        </p:txBody>
+      </p:sp>
+      <p:sp>
+        <p:nvSpPr>
+          <p:cNvPr id="18" name="Rectangle 17">
+            <a:extLst>
+              <a:ext uri="{FF2B5EF4-FFF2-40B4-BE49-F238E27FC236}">
+                <a16:creationId xmlns:a16="http://schemas.microsoft.com/office/drawing/2014/main" id="{6CD57780-7F79-EE45-8C1B-71B05B791576}"/>
+              </a:ext>
+            </a:extLst>
+          </p:cNvPr>
+          <p:cNvSpPr/>
+          <p:nvPr/>
+        </p:nvSpPr>
+        <p:spPr>
+          <a:xfrm>
+            <a:off x="4934608" y="3769736"/>
+            <a:ext cx="2301766" cy="522890"/>
+          </a:xfrm>
+          <a:prstGeom prst="rect">
+            <a:avLst/>
+          </a:prstGeom>
+        </p:spPr>
+        <p:style>
+          <a:lnRef idx="2">
+            <a:schemeClr val="accent1">
+              <a:shade val="50000"/>
+            </a:schemeClr>
+          </a:lnRef>
+          <a:fillRef idx="1">
+            <a:schemeClr val="accent1"/>
+          </a:fillRef>
+          <a:effectRef idx="0">
+            <a:schemeClr val="accent1"/>
+          </a:effectRef>
+          <a:fontRef idx="minor">
+            <a:schemeClr val="lt1"/>
+          </a:fontRef>
+        </p:style>
+        <p:txBody>
+          <a:bodyPr rtlCol="0" anchor="ctr"/>
+          <a:lstStyle/>
+          <a:p>
+            <a:pPr algn="ctr"/>
+            <a:r>
+              <a:rPr lang="en-US" dirty="0"/>
+              <a:t>__proto__</a:t>
+            </a:r>
+          </a:p>
+        </p:txBody>
+      </p:sp>
+      <p:sp>
+        <p:nvSpPr>
+          <p:cNvPr id="19" name="Rectangle 18">
+            <a:extLst>
+              <a:ext uri="{FF2B5EF4-FFF2-40B4-BE49-F238E27FC236}">
+                <a16:creationId xmlns:a16="http://schemas.microsoft.com/office/drawing/2014/main" id="{722181C8-5A4B-804F-AE44-6FB2F71AE9B1}"/>
+              </a:ext>
+            </a:extLst>
+          </p:cNvPr>
+          <p:cNvSpPr/>
+          <p:nvPr/>
+        </p:nvSpPr>
+        <p:spPr>
+          <a:xfrm>
+            <a:off x="4934608" y="3280897"/>
+            <a:ext cx="2301766" cy="567558"/>
+          </a:xfrm>
+          <a:prstGeom prst="rect">
+            <a:avLst/>
+          </a:prstGeom>
+        </p:spPr>
+        <p:style>
+          <a:lnRef idx="2">
+            <a:schemeClr val="accent1">
+              <a:shade val="50000"/>
+            </a:schemeClr>
+          </a:lnRef>
+          <a:fillRef idx="1">
+            <a:schemeClr val="accent1"/>
+          </a:fillRef>
+          <a:effectRef idx="0">
+            <a:schemeClr val="accent1"/>
+          </a:effectRef>
+          <a:fontRef idx="minor">
+            <a:schemeClr val="lt1"/>
+          </a:fontRef>
+        </p:style>
+        <p:txBody>
+          <a:bodyPr rtlCol="0" anchor="ctr"/>
+          <a:lstStyle/>
+          <a:p>
+            <a:pPr algn="ctr"/>
+            <a:r>
+              <a:rPr lang="en-US" dirty="0"/>
+              <a:t>Properties</a:t>
+            </a:r>
+          </a:p>
+        </p:txBody>
+      </p:sp>
+      <p:sp>
+        <p:nvSpPr>
+          <p:cNvPr id="20" name="Rectangle 19">
+            <a:extLst>
+              <a:ext uri="{FF2B5EF4-FFF2-40B4-BE49-F238E27FC236}">
+                <a16:creationId xmlns:a16="http://schemas.microsoft.com/office/drawing/2014/main" id="{B1936A35-D846-F74F-B9EB-F6E2BF71EEC5}"/>
+              </a:ext>
+            </a:extLst>
+          </p:cNvPr>
+          <p:cNvSpPr/>
+          <p:nvPr/>
+        </p:nvSpPr>
+        <p:spPr>
+          <a:xfrm>
+            <a:off x="4934608" y="2673980"/>
+            <a:ext cx="2301766" cy="567558"/>
+          </a:xfrm>
+          <a:prstGeom prst="rect">
+            <a:avLst/>
+          </a:prstGeom>
+        </p:spPr>
+        <p:style>
+          <a:lnRef idx="2">
+            <a:schemeClr val="accent1">
+              <a:shade val="50000"/>
+            </a:schemeClr>
+          </a:lnRef>
+          <a:fillRef idx="1">
+            <a:schemeClr val="accent1"/>
+          </a:fillRef>
+          <a:effectRef idx="0">
+            <a:schemeClr val="accent1"/>
+          </a:effectRef>
+          <a:fontRef idx="minor">
+            <a:schemeClr val="lt1"/>
+          </a:fontRef>
+        </p:style>
+        <p:txBody>
+          <a:bodyPr rtlCol="0" anchor="ctr"/>
+          <a:lstStyle/>
+          <a:p>
+            <a:pPr algn="ctr"/>
+            <a:r>
+              <a:rPr lang="en-US" dirty="0"/>
+              <a:t>Methods</a:t>
+            </a:r>
+          </a:p>
+        </p:txBody>
+      </p:sp>
+      <p:sp>
+        <p:nvSpPr>
+          <p:cNvPr id="21" name="Rectangle 20">
+            <a:extLst>
+              <a:ext uri="{FF2B5EF4-FFF2-40B4-BE49-F238E27FC236}">
+                <a16:creationId xmlns:a16="http://schemas.microsoft.com/office/drawing/2014/main" id="{C382856D-3487-5340-AB6F-2B2725459E60}"/>
+              </a:ext>
+            </a:extLst>
+          </p:cNvPr>
+          <p:cNvSpPr/>
+          <p:nvPr/>
+        </p:nvSpPr>
+        <p:spPr>
+          <a:xfrm>
+            <a:off x="5197366" y="4798467"/>
+            <a:ext cx="1776250" cy="1654853"/>
+          </a:xfrm>
+          <a:prstGeom prst="rect">
+            <a:avLst/>
+          </a:prstGeom>
+          <a:solidFill>
+            <a:schemeClr val="accent4">
+              <a:lumMod val="60000"/>
+              <a:lumOff val="40000"/>
+            </a:schemeClr>
+          </a:solidFill>
+        </p:spPr>
+        <p:style>
+          <a:lnRef idx="2">
+            <a:schemeClr val="accent1">
+              <a:shade val="50000"/>
+            </a:schemeClr>
+          </a:lnRef>
+          <a:fillRef idx="1">
+            <a:schemeClr val="accent1"/>
+          </a:fillRef>
+          <a:effectRef idx="0">
+            <a:schemeClr val="accent1"/>
+          </a:effectRef>
+          <a:fontRef idx="minor">
+            <a:schemeClr val="lt1"/>
+          </a:fontRef>
+        </p:style>
+        <p:txBody>
+          <a:bodyPr rtlCol="0" anchor="ctr"/>
+          <a:lstStyle/>
+          <a:p>
+            <a:pPr marL="285750" indent="-285750">
+              <a:buFont typeface="Arial" panose="020B0604020202020204" pitchFamily="34" charset="0"/>
+              <a:buChar char="•"/>
+            </a:pPr>
+            <a:r>
+              <a:rPr lang="en-US" sz="1400" dirty="0">
+                <a:solidFill>
+                  <a:schemeClr val="accent5"/>
+                </a:solidFill>
+              </a:rPr>
+              <a:t>Constructor</a:t>
+            </a:r>
+          </a:p>
+          <a:p>
+            <a:pPr marL="285750" indent="-285750">
+              <a:buFont typeface="Arial" panose="020B0604020202020204" pitchFamily="34" charset="0"/>
+              <a:buChar char="•"/>
+            </a:pPr>
+            <a:endParaRPr lang="en-US" sz="1400" dirty="0">
+              <a:solidFill>
+                <a:schemeClr val="accent5"/>
+              </a:solidFill>
+            </a:endParaRPr>
+          </a:p>
+          <a:p>
+            <a:pPr marL="285750" indent="-285750">
+              <a:buFont typeface="Arial" panose="020B0604020202020204" pitchFamily="34" charset="0"/>
+              <a:buChar char="•"/>
+            </a:pPr>
+            <a:r>
+              <a:rPr lang="en-US" sz="1400" dirty="0">
+                <a:solidFill>
+                  <a:schemeClr val="accent5"/>
+                </a:solidFill>
+              </a:rPr>
+              <a:t>getNumber( )</a:t>
+            </a:r>
+          </a:p>
+          <a:p>
+            <a:r>
+              <a:rPr lang="en-US" sz="1400" dirty="0">
+                <a:solidFill>
+                  <a:schemeClr val="accent5"/>
+                </a:solidFill>
+              </a:rPr>
+              <a:t> </a:t>
+            </a:r>
+          </a:p>
+        </p:txBody>
+      </p:sp>
+      <p:sp>
+        <p:nvSpPr>
+          <p:cNvPr id="23" name="Down Arrow 22">
+            <a:extLst>
+              <a:ext uri="{FF2B5EF4-FFF2-40B4-BE49-F238E27FC236}">
+                <a16:creationId xmlns:a16="http://schemas.microsoft.com/office/drawing/2014/main" id="{9B8334D7-C062-9A4E-B53F-7C009EDCC46C}"/>
+              </a:ext>
+            </a:extLst>
+          </p:cNvPr>
+          <p:cNvSpPr/>
+          <p:nvPr/>
+        </p:nvSpPr>
+        <p:spPr>
+          <a:xfrm>
+            <a:off x="4950372" y="2397343"/>
+            <a:ext cx="493988" cy="2585545"/>
+          </a:xfrm>
+          <a:prstGeom prst="downArrow">
+            <a:avLst/>
+          </a:prstGeom>
+          <a:ln>
+            <a:solidFill>
+              <a:schemeClr val="accent4"/>
+            </a:solidFill>
+          </a:ln>
+        </p:spPr>
+        <p:style>
+          <a:lnRef idx="2">
+            <a:schemeClr val="accent1">
+              <a:shade val="50000"/>
+            </a:schemeClr>
+          </a:lnRef>
+          <a:fillRef idx="1">
+            <a:schemeClr val="accent1"/>
+          </a:fillRef>
+          <a:effectRef idx="0">
+            <a:schemeClr val="accent1"/>
+          </a:effectRef>
+          <a:fontRef idx="minor">
+            <a:schemeClr val="lt1"/>
+          </a:fontRef>
+        </p:style>
+        <p:txBody>
+          <a:bodyPr rtlCol="0" anchor="ctr"/>
+          <a:lstStyle/>
+          <a:p>
+            <a:pPr algn="ctr"/>
+            <a:endParaRPr lang="en-US"/>
+          </a:p>
+        </p:txBody>
+      </p:sp>
+      <p:sp>
+        <p:nvSpPr>
+          <p:cNvPr id="24" name="Rectangle 23">
+            <a:extLst>
+              <a:ext uri="{FF2B5EF4-FFF2-40B4-BE49-F238E27FC236}">
+                <a16:creationId xmlns:a16="http://schemas.microsoft.com/office/drawing/2014/main" id="{F66B43CD-A707-DA43-9535-914AD70BF5F4}"/>
+              </a:ext>
+            </a:extLst>
+          </p:cNvPr>
+          <p:cNvSpPr/>
+          <p:nvPr/>
+        </p:nvSpPr>
+        <p:spPr>
+          <a:xfrm>
+            <a:off x="1213944" y="589957"/>
+            <a:ext cx="2301766" cy="1807386"/>
+          </a:xfrm>
+          <a:prstGeom prst="rect">
+            <a:avLst/>
+          </a:prstGeom>
+          <a:solidFill>
+            <a:schemeClr val="bg2"/>
+          </a:solidFill>
+        </p:spPr>
+        <p:style>
+          <a:lnRef idx="2">
+            <a:schemeClr val="accent1">
+              <a:shade val="50000"/>
+            </a:schemeClr>
+          </a:lnRef>
+          <a:fillRef idx="1">
+            <a:schemeClr val="accent1"/>
+          </a:fillRef>
+          <a:effectRef idx="0">
+            <a:schemeClr val="accent1"/>
+          </a:effectRef>
+          <a:fontRef idx="minor">
+            <a:schemeClr val="lt1"/>
+          </a:fontRef>
+        </p:style>
+        <p:txBody>
+          <a:bodyPr rtlCol="0" anchor="ctr"/>
+          <a:lstStyle/>
+          <a:p>
+            <a:pPr algn="ctr"/>
+            <a:endParaRPr lang="en-US" dirty="0"/>
+          </a:p>
+          <a:p>
+            <a:pPr algn="ctr"/>
+            <a:endParaRPr lang="en-US" dirty="0"/>
+          </a:p>
+        </p:txBody>
+      </p:sp>
+      <p:sp>
+        <p:nvSpPr>
+          <p:cNvPr id="25" name="Rectangle 24">
+            <a:extLst>
+              <a:ext uri="{FF2B5EF4-FFF2-40B4-BE49-F238E27FC236}">
+                <a16:creationId xmlns:a16="http://schemas.microsoft.com/office/drawing/2014/main" id="{92292F6B-1355-C54F-87B2-8792BA977CB6}"/>
+              </a:ext>
+            </a:extLst>
+          </p:cNvPr>
+          <p:cNvSpPr/>
+          <p:nvPr/>
+        </p:nvSpPr>
+        <p:spPr>
+          <a:xfrm>
+            <a:off x="1213944" y="899847"/>
+            <a:ext cx="2301766" cy="255790"/>
+          </a:xfrm>
+          <a:prstGeom prst="rect">
+            <a:avLst/>
+          </a:prstGeom>
+          <a:solidFill>
+            <a:schemeClr val="accent4">
+              <a:lumMod val="60000"/>
+              <a:lumOff val="40000"/>
+            </a:schemeClr>
+          </a:solidFill>
+        </p:spPr>
+        <p:style>
+          <a:lnRef idx="2">
+            <a:schemeClr val="accent1">
+              <a:shade val="50000"/>
+            </a:schemeClr>
+          </a:lnRef>
+          <a:fillRef idx="1">
+            <a:schemeClr val="accent1"/>
+          </a:fillRef>
+          <a:effectRef idx="0">
+            <a:schemeClr val="accent1"/>
+          </a:effectRef>
+          <a:fontRef idx="minor">
+            <a:schemeClr val="lt1"/>
+          </a:fontRef>
+        </p:style>
+        <p:txBody>
+          <a:bodyPr rtlCol="0" anchor="ctr"/>
+          <a:lstStyle/>
+          <a:p>
+            <a:pPr algn="ctr"/>
+            <a:r>
+              <a:rPr lang="en-US" dirty="0">
+                <a:solidFill>
+                  <a:schemeClr val="accent5"/>
+                </a:solidFill>
+              </a:rPr>
+              <a:t>a.prototype</a:t>
+            </a:r>
+          </a:p>
+        </p:txBody>
+      </p:sp>
+      <p:sp>
+        <p:nvSpPr>
+          <p:cNvPr id="26" name="Rectangle 25">
+            <a:extLst>
+              <a:ext uri="{FF2B5EF4-FFF2-40B4-BE49-F238E27FC236}">
+                <a16:creationId xmlns:a16="http://schemas.microsoft.com/office/drawing/2014/main" id="{DBCCE47C-BE74-C042-A6E2-4B7A3C5DA4FD}"/>
+              </a:ext>
+            </a:extLst>
+          </p:cNvPr>
+          <p:cNvSpPr/>
+          <p:nvPr/>
+        </p:nvSpPr>
+        <p:spPr>
+          <a:xfrm>
+            <a:off x="1208683" y="2051395"/>
+            <a:ext cx="2301766" cy="298318"/>
+          </a:xfrm>
+          <a:prstGeom prst="rect">
+            <a:avLst/>
+          </a:prstGeom>
+        </p:spPr>
+        <p:style>
+          <a:lnRef idx="2">
+            <a:schemeClr val="accent1">
+              <a:shade val="50000"/>
+            </a:schemeClr>
+          </a:lnRef>
+          <a:fillRef idx="1">
+            <a:schemeClr val="accent1"/>
+          </a:fillRef>
+          <a:effectRef idx="0">
+            <a:schemeClr val="accent1"/>
+          </a:effectRef>
+          <a:fontRef idx="minor">
+            <a:schemeClr val="lt1"/>
+          </a:fontRef>
+        </p:style>
+        <p:txBody>
+          <a:bodyPr rtlCol="0" anchor="ctr"/>
+          <a:lstStyle/>
+          <a:p>
+            <a:pPr algn="ctr"/>
+            <a:r>
+              <a:rPr lang="en-US" dirty="0"/>
+              <a:t>__proto__</a:t>
+            </a:r>
+          </a:p>
+        </p:txBody>
+      </p:sp>
+      <p:sp>
+        <p:nvSpPr>
+          <p:cNvPr id="27" name="Rectangle 26">
+            <a:extLst>
+              <a:ext uri="{FF2B5EF4-FFF2-40B4-BE49-F238E27FC236}">
+                <a16:creationId xmlns:a16="http://schemas.microsoft.com/office/drawing/2014/main" id="{19422B35-6C85-8B43-81C3-63761A95CAB4}"/>
+              </a:ext>
+            </a:extLst>
+          </p:cNvPr>
+          <p:cNvSpPr/>
+          <p:nvPr/>
+        </p:nvSpPr>
+        <p:spPr>
+          <a:xfrm>
+            <a:off x="1208683" y="1520627"/>
+            <a:ext cx="2301766" cy="295417"/>
+          </a:xfrm>
+          <a:prstGeom prst="rect">
+            <a:avLst/>
+          </a:prstGeom>
+        </p:spPr>
+        <p:style>
+          <a:lnRef idx="2">
+            <a:schemeClr val="accent1">
+              <a:shade val="50000"/>
+            </a:schemeClr>
+          </a:lnRef>
+          <a:fillRef idx="1">
+            <a:schemeClr val="accent1"/>
+          </a:fillRef>
+          <a:effectRef idx="0">
+            <a:schemeClr val="accent1"/>
+          </a:effectRef>
+          <a:fontRef idx="minor">
+            <a:schemeClr val="lt1"/>
+          </a:fontRef>
+        </p:style>
+        <p:txBody>
+          <a:bodyPr rtlCol="0" anchor="ctr"/>
+          <a:lstStyle/>
+          <a:p>
+            <a:pPr algn="ctr"/>
+            <a:r>
+              <a:rPr lang="en-US" dirty="0"/>
+              <a:t>Properties</a:t>
+            </a:r>
+          </a:p>
+        </p:txBody>
+      </p:sp>
+      <p:sp>
+        <p:nvSpPr>
+          <p:cNvPr id="28" name="Rectangle 27">
+            <a:extLst>
+              <a:ext uri="{FF2B5EF4-FFF2-40B4-BE49-F238E27FC236}">
+                <a16:creationId xmlns:a16="http://schemas.microsoft.com/office/drawing/2014/main" id="{4C387A7F-55AE-DF4D-B321-DAAF7D90CEC6}"/>
+              </a:ext>
+            </a:extLst>
+          </p:cNvPr>
+          <p:cNvSpPr/>
+          <p:nvPr/>
+        </p:nvSpPr>
+        <p:spPr>
+          <a:xfrm>
+            <a:off x="1213944" y="1162593"/>
+            <a:ext cx="2301766" cy="295416"/>
+          </a:xfrm>
+          <a:prstGeom prst="rect">
+            <a:avLst/>
+          </a:prstGeom>
+        </p:spPr>
+        <p:style>
+          <a:lnRef idx="2">
+            <a:schemeClr val="accent1">
+              <a:shade val="50000"/>
+            </a:schemeClr>
+          </a:lnRef>
+          <a:fillRef idx="1">
+            <a:schemeClr val="accent1"/>
+          </a:fillRef>
+          <a:effectRef idx="0">
+            <a:schemeClr val="accent1"/>
+          </a:effectRef>
+          <a:fontRef idx="minor">
+            <a:schemeClr val="lt1"/>
+          </a:fontRef>
+        </p:style>
+        <p:txBody>
+          <a:bodyPr rtlCol="0" anchor="ctr"/>
+          <a:lstStyle/>
+          <a:p>
+            <a:pPr algn="ctr"/>
+            <a:r>
+              <a:rPr lang="en-US" dirty="0"/>
+              <a:t>Methods</a:t>
+            </a:r>
+          </a:p>
+        </p:txBody>
+      </p:sp>
+      <p:sp>
+        <p:nvSpPr>
+          <p:cNvPr id="29" name="Rectangle 28">
+            <a:extLst>
+              <a:ext uri="{FF2B5EF4-FFF2-40B4-BE49-F238E27FC236}">
+                <a16:creationId xmlns:a16="http://schemas.microsoft.com/office/drawing/2014/main" id="{19A95C48-D513-C24A-9529-E699076A969D}"/>
+              </a:ext>
+            </a:extLst>
+          </p:cNvPr>
+          <p:cNvSpPr/>
+          <p:nvPr/>
+        </p:nvSpPr>
+        <p:spPr>
+          <a:xfrm>
+            <a:off x="1208683" y="1804496"/>
+            <a:ext cx="2301766" cy="245316"/>
+          </a:xfrm>
+          <a:prstGeom prst="rect">
+            <a:avLst/>
+          </a:prstGeom>
+        </p:spPr>
+        <p:style>
+          <a:lnRef idx="2">
+            <a:schemeClr val="accent1">
+              <a:shade val="50000"/>
+            </a:schemeClr>
+          </a:lnRef>
+          <a:fillRef idx="1">
+            <a:schemeClr val="accent1"/>
+          </a:fillRef>
+          <a:effectRef idx="0">
+            <a:schemeClr val="accent1"/>
+          </a:effectRef>
+          <a:fontRef idx="minor">
+            <a:schemeClr val="lt1"/>
+          </a:fontRef>
+        </p:style>
+        <p:txBody>
+          <a:bodyPr rtlCol="0" anchor="ctr"/>
+          <a:lstStyle/>
+          <a:p>
+            <a:pPr algn="ctr"/>
+            <a:r>
+              <a:rPr lang="en-US" dirty="0"/>
+              <a:t>number : 1</a:t>
+            </a:r>
+          </a:p>
+        </p:txBody>
+      </p:sp>
+      <p:sp>
+        <p:nvSpPr>
+          <p:cNvPr id="30" name="TextBox 29">
+            <a:extLst>
+              <a:ext uri="{FF2B5EF4-FFF2-40B4-BE49-F238E27FC236}">
+                <a16:creationId xmlns:a16="http://schemas.microsoft.com/office/drawing/2014/main" id="{80D9DD3D-EB8E-C740-9613-DCBE88A037E4}"/>
+              </a:ext>
+            </a:extLst>
+          </p:cNvPr>
+          <p:cNvSpPr txBox="1"/>
+          <p:nvPr/>
+        </p:nvSpPr>
+        <p:spPr>
+          <a:xfrm>
+            <a:off x="1187665" y="481799"/>
+            <a:ext cx="2301766" cy="461665"/>
+          </a:xfrm>
+          <a:prstGeom prst="rect">
+            <a:avLst/>
+          </a:prstGeom>
+          <a:noFill/>
+        </p:spPr>
+        <p:txBody>
+          <a:bodyPr wrap="square" rtlCol="0">
+            <a:spAutoFit/>
+          </a:bodyPr>
+          <a:lstStyle/>
+          <a:p>
+            <a:pPr algn="ctr"/>
+            <a:r>
+              <a:rPr lang="en-US" sz="2400" dirty="0">
+                <a:solidFill>
+                  <a:schemeClr val="accent4">
+                    <a:lumMod val="40000"/>
+                    <a:lumOff val="60000"/>
+                  </a:schemeClr>
+                </a:solidFill>
+              </a:rPr>
+              <a:t>a</a:t>
+            </a:r>
+          </a:p>
+        </p:txBody>
+      </p:sp>
+      <p:sp>
+        <p:nvSpPr>
+          <p:cNvPr id="66" name="Rectangle 65">
+            <a:extLst>
+              <a:ext uri="{FF2B5EF4-FFF2-40B4-BE49-F238E27FC236}">
+                <a16:creationId xmlns:a16="http://schemas.microsoft.com/office/drawing/2014/main" id="{5210A7F3-C7E6-7D46-826B-6E87492D66A1}"/>
+              </a:ext>
+            </a:extLst>
+          </p:cNvPr>
+          <p:cNvSpPr/>
+          <p:nvPr/>
+        </p:nvSpPr>
+        <p:spPr>
+          <a:xfrm>
+            <a:off x="1212913" y="2598171"/>
+            <a:ext cx="2301766" cy="1807386"/>
+          </a:xfrm>
+          <a:prstGeom prst="rect">
+            <a:avLst/>
+          </a:prstGeom>
+          <a:solidFill>
+            <a:schemeClr val="bg2"/>
+          </a:solidFill>
+        </p:spPr>
+        <p:style>
+          <a:lnRef idx="2">
+            <a:schemeClr val="accent1">
+              <a:shade val="50000"/>
+            </a:schemeClr>
+          </a:lnRef>
+          <a:fillRef idx="1">
+            <a:schemeClr val="accent1"/>
+          </a:fillRef>
+          <a:effectRef idx="0">
+            <a:schemeClr val="accent1"/>
+          </a:effectRef>
+          <a:fontRef idx="minor">
+            <a:schemeClr val="lt1"/>
+          </a:fontRef>
+        </p:style>
+        <p:txBody>
+          <a:bodyPr rtlCol="0" anchor="ctr"/>
+          <a:lstStyle/>
+          <a:p>
+            <a:pPr algn="ctr"/>
+            <a:endParaRPr lang="en-US" dirty="0"/>
+          </a:p>
+          <a:p>
+            <a:pPr algn="ctr"/>
+            <a:endParaRPr lang="en-US" dirty="0"/>
+          </a:p>
+        </p:txBody>
+      </p:sp>
+      <p:sp>
+        <p:nvSpPr>
+          <p:cNvPr id="67" name="Rectangle 66">
+            <a:extLst>
+              <a:ext uri="{FF2B5EF4-FFF2-40B4-BE49-F238E27FC236}">
+                <a16:creationId xmlns:a16="http://schemas.microsoft.com/office/drawing/2014/main" id="{D378D298-7B54-1745-9B41-F207DCC0AC81}"/>
+              </a:ext>
+            </a:extLst>
+          </p:cNvPr>
+          <p:cNvSpPr/>
+          <p:nvPr/>
+        </p:nvSpPr>
+        <p:spPr>
+          <a:xfrm>
+            <a:off x="1210333" y="2930772"/>
+            <a:ext cx="2301766" cy="255790"/>
+          </a:xfrm>
+          <a:prstGeom prst="rect">
+            <a:avLst/>
+          </a:prstGeom>
+          <a:solidFill>
+            <a:schemeClr val="accent4">
+              <a:lumMod val="60000"/>
+              <a:lumOff val="40000"/>
+            </a:schemeClr>
+          </a:solidFill>
+        </p:spPr>
+        <p:style>
+          <a:lnRef idx="2">
+            <a:schemeClr val="accent1">
+              <a:shade val="50000"/>
+            </a:schemeClr>
+          </a:lnRef>
+          <a:fillRef idx="1">
+            <a:schemeClr val="accent1"/>
+          </a:fillRef>
+          <a:effectRef idx="0">
+            <a:schemeClr val="accent1"/>
+          </a:effectRef>
+          <a:fontRef idx="minor">
+            <a:schemeClr val="lt1"/>
+          </a:fontRef>
+        </p:style>
+        <p:txBody>
+          <a:bodyPr rtlCol="0" anchor="ctr"/>
+          <a:lstStyle/>
+          <a:p>
+            <a:pPr algn="ctr"/>
+            <a:r>
+              <a:rPr lang="en-US" dirty="0">
+                <a:solidFill>
+                  <a:schemeClr val="accent5"/>
+                </a:solidFill>
+              </a:rPr>
+              <a:t>b.prototype</a:t>
+            </a:r>
+          </a:p>
+        </p:txBody>
+      </p:sp>
+      <p:sp>
+        <p:nvSpPr>
+          <p:cNvPr id="68" name="Rectangle 67">
+            <a:extLst>
+              <a:ext uri="{FF2B5EF4-FFF2-40B4-BE49-F238E27FC236}">
+                <a16:creationId xmlns:a16="http://schemas.microsoft.com/office/drawing/2014/main" id="{498F5ACE-8768-6841-8A13-534B1F18CBF1}"/>
+              </a:ext>
+            </a:extLst>
+          </p:cNvPr>
+          <p:cNvSpPr/>
+          <p:nvPr/>
+        </p:nvSpPr>
+        <p:spPr>
+          <a:xfrm>
+            <a:off x="1207652" y="4059609"/>
+            <a:ext cx="2301766" cy="298318"/>
+          </a:xfrm>
+          <a:prstGeom prst="rect">
+            <a:avLst/>
+          </a:prstGeom>
+        </p:spPr>
+        <p:style>
+          <a:lnRef idx="2">
+            <a:schemeClr val="accent1">
+              <a:shade val="50000"/>
+            </a:schemeClr>
+          </a:lnRef>
+          <a:fillRef idx="1">
+            <a:schemeClr val="accent1"/>
+          </a:fillRef>
+          <a:effectRef idx="0">
+            <a:schemeClr val="accent1"/>
+          </a:effectRef>
+          <a:fontRef idx="minor">
+            <a:schemeClr val="lt1"/>
+          </a:fontRef>
+        </p:style>
+        <p:txBody>
+          <a:bodyPr rtlCol="0" anchor="ctr"/>
+          <a:lstStyle/>
+          <a:p>
+            <a:pPr algn="ctr"/>
+            <a:r>
+              <a:rPr lang="en-US" dirty="0"/>
+              <a:t>__proto__</a:t>
+            </a:r>
+          </a:p>
+        </p:txBody>
+      </p:sp>
+      <p:sp>
+        <p:nvSpPr>
+          <p:cNvPr id="69" name="Rectangle 68">
+            <a:extLst>
+              <a:ext uri="{FF2B5EF4-FFF2-40B4-BE49-F238E27FC236}">
+                <a16:creationId xmlns:a16="http://schemas.microsoft.com/office/drawing/2014/main" id="{91D7F96B-F8AA-DA4B-A25C-557A132E8BB6}"/>
+              </a:ext>
+            </a:extLst>
+          </p:cNvPr>
+          <p:cNvSpPr/>
+          <p:nvPr/>
+        </p:nvSpPr>
+        <p:spPr>
+          <a:xfrm>
+            <a:off x="1207652" y="3528841"/>
+            <a:ext cx="2301766" cy="295417"/>
+          </a:xfrm>
+          <a:prstGeom prst="rect">
+            <a:avLst/>
+          </a:prstGeom>
+        </p:spPr>
+        <p:style>
+          <a:lnRef idx="2">
+            <a:schemeClr val="accent1">
+              <a:shade val="50000"/>
+            </a:schemeClr>
+          </a:lnRef>
+          <a:fillRef idx="1">
+            <a:schemeClr val="accent1"/>
+          </a:fillRef>
+          <a:effectRef idx="0">
+            <a:schemeClr val="accent1"/>
+          </a:effectRef>
+          <a:fontRef idx="minor">
+            <a:schemeClr val="lt1"/>
+          </a:fontRef>
+        </p:style>
+        <p:txBody>
+          <a:bodyPr rtlCol="0" anchor="ctr"/>
+          <a:lstStyle/>
+          <a:p>
+            <a:pPr algn="ctr"/>
+            <a:r>
+              <a:rPr lang="en-US" dirty="0"/>
+              <a:t>Properties</a:t>
+            </a:r>
+          </a:p>
+        </p:txBody>
+      </p:sp>
+      <p:sp>
+        <p:nvSpPr>
+          <p:cNvPr id="70" name="Rectangle 69">
+            <a:extLst>
+              <a:ext uri="{FF2B5EF4-FFF2-40B4-BE49-F238E27FC236}">
+                <a16:creationId xmlns:a16="http://schemas.microsoft.com/office/drawing/2014/main" id="{12BEF5D6-7AB8-E545-8073-8EA610130802}"/>
+              </a:ext>
+            </a:extLst>
+          </p:cNvPr>
+          <p:cNvSpPr/>
+          <p:nvPr/>
+        </p:nvSpPr>
+        <p:spPr>
+          <a:xfrm>
+            <a:off x="1212913" y="3170807"/>
+            <a:ext cx="2301766" cy="295416"/>
+          </a:xfrm>
+          <a:prstGeom prst="rect">
+            <a:avLst/>
+          </a:prstGeom>
+        </p:spPr>
+        <p:style>
+          <a:lnRef idx="2">
+            <a:schemeClr val="accent1">
+              <a:shade val="50000"/>
+            </a:schemeClr>
+          </a:lnRef>
+          <a:fillRef idx="1">
+            <a:schemeClr val="accent1"/>
+          </a:fillRef>
+          <a:effectRef idx="0">
+            <a:schemeClr val="accent1"/>
+          </a:effectRef>
+          <a:fontRef idx="minor">
+            <a:schemeClr val="lt1"/>
+          </a:fontRef>
+        </p:style>
+        <p:txBody>
+          <a:bodyPr rtlCol="0" anchor="ctr"/>
+          <a:lstStyle/>
+          <a:p>
+            <a:pPr algn="ctr"/>
+            <a:r>
+              <a:rPr lang="en-US" dirty="0"/>
+              <a:t>Methods</a:t>
+            </a:r>
+          </a:p>
+        </p:txBody>
+      </p:sp>
+      <p:sp>
+        <p:nvSpPr>
+          <p:cNvPr id="71" name="Rectangle 70">
+            <a:extLst>
+              <a:ext uri="{FF2B5EF4-FFF2-40B4-BE49-F238E27FC236}">
+                <a16:creationId xmlns:a16="http://schemas.microsoft.com/office/drawing/2014/main" id="{F42F6634-3B2B-944E-9DFF-EFD0504D639E}"/>
+              </a:ext>
+            </a:extLst>
+          </p:cNvPr>
+          <p:cNvSpPr/>
+          <p:nvPr/>
+        </p:nvSpPr>
+        <p:spPr>
+          <a:xfrm>
+            <a:off x="1207652" y="3812710"/>
+            <a:ext cx="2301766" cy="245316"/>
+          </a:xfrm>
+          <a:prstGeom prst="rect">
+            <a:avLst/>
+          </a:prstGeom>
+        </p:spPr>
+        <p:style>
+          <a:lnRef idx="2">
+            <a:schemeClr val="accent1">
+              <a:shade val="50000"/>
+            </a:schemeClr>
+          </a:lnRef>
+          <a:fillRef idx="1">
+            <a:schemeClr val="accent1"/>
+          </a:fillRef>
+          <a:effectRef idx="0">
+            <a:schemeClr val="accent1"/>
+          </a:effectRef>
+          <a:fontRef idx="minor">
+            <a:schemeClr val="lt1"/>
+          </a:fontRef>
+        </p:style>
+        <p:txBody>
+          <a:bodyPr rtlCol="0" anchor="ctr"/>
+          <a:lstStyle/>
+          <a:p>
+            <a:pPr algn="ctr"/>
+            <a:r>
+              <a:rPr lang="en-US" dirty="0"/>
+              <a:t>number : 2</a:t>
+            </a:r>
+          </a:p>
+        </p:txBody>
+      </p:sp>
+      <p:sp>
+        <p:nvSpPr>
+          <p:cNvPr id="72" name="TextBox 71">
+            <a:extLst>
+              <a:ext uri="{FF2B5EF4-FFF2-40B4-BE49-F238E27FC236}">
+                <a16:creationId xmlns:a16="http://schemas.microsoft.com/office/drawing/2014/main" id="{04A53A22-20C2-9346-9031-2C4FC5642316}"/>
+              </a:ext>
+            </a:extLst>
+          </p:cNvPr>
+          <p:cNvSpPr txBox="1"/>
+          <p:nvPr/>
+        </p:nvSpPr>
+        <p:spPr>
+          <a:xfrm>
+            <a:off x="1187665" y="2534384"/>
+            <a:ext cx="2301766" cy="461665"/>
+          </a:xfrm>
+          <a:prstGeom prst="rect">
+            <a:avLst/>
+          </a:prstGeom>
+          <a:noFill/>
+        </p:spPr>
+        <p:txBody>
+          <a:bodyPr wrap="square" rtlCol="0">
+            <a:spAutoFit/>
+          </a:bodyPr>
+          <a:lstStyle/>
+          <a:p>
+            <a:pPr algn="ctr"/>
+            <a:r>
+              <a:rPr lang="en-US" sz="2400" dirty="0">
+                <a:solidFill>
+                  <a:schemeClr val="accent4">
+                    <a:lumMod val="40000"/>
+                    <a:lumOff val="60000"/>
+                  </a:schemeClr>
+                </a:solidFill>
+              </a:rPr>
+              <a:t>b</a:t>
+            </a:r>
+          </a:p>
+        </p:txBody>
+      </p:sp>
+      <p:sp>
+        <p:nvSpPr>
+          <p:cNvPr id="73" name="Rectangle 72">
+            <a:extLst>
+              <a:ext uri="{FF2B5EF4-FFF2-40B4-BE49-F238E27FC236}">
+                <a16:creationId xmlns:a16="http://schemas.microsoft.com/office/drawing/2014/main" id="{3612120E-D277-6247-9D7F-C98B9D36F2D7}"/>
+              </a:ext>
+            </a:extLst>
+          </p:cNvPr>
+          <p:cNvSpPr/>
+          <p:nvPr/>
+        </p:nvSpPr>
+        <p:spPr>
+          <a:xfrm>
+            <a:off x="1236612" y="4655631"/>
+            <a:ext cx="2301766" cy="1807386"/>
+          </a:xfrm>
+          <a:prstGeom prst="rect">
+            <a:avLst/>
+          </a:prstGeom>
+          <a:solidFill>
+            <a:schemeClr val="bg2"/>
+          </a:solidFill>
+        </p:spPr>
+        <p:style>
+          <a:lnRef idx="2">
+            <a:schemeClr val="accent1">
+              <a:shade val="50000"/>
+            </a:schemeClr>
+          </a:lnRef>
+          <a:fillRef idx="1">
+            <a:schemeClr val="accent1"/>
+          </a:fillRef>
+          <a:effectRef idx="0">
+            <a:schemeClr val="accent1"/>
+          </a:effectRef>
+          <a:fontRef idx="minor">
+            <a:schemeClr val="lt1"/>
+          </a:fontRef>
+        </p:style>
+        <p:txBody>
+          <a:bodyPr rtlCol="0" anchor="ctr"/>
+          <a:lstStyle/>
+          <a:p>
+            <a:pPr algn="ctr"/>
+            <a:endParaRPr lang="en-US" dirty="0"/>
+          </a:p>
+          <a:p>
+            <a:pPr algn="ctr"/>
+            <a:endParaRPr lang="en-US" dirty="0"/>
+          </a:p>
+        </p:txBody>
+      </p:sp>
+      <p:sp>
+        <p:nvSpPr>
+          <p:cNvPr id="74" name="Rectangle 73">
+            <a:extLst>
+              <a:ext uri="{FF2B5EF4-FFF2-40B4-BE49-F238E27FC236}">
+                <a16:creationId xmlns:a16="http://schemas.microsoft.com/office/drawing/2014/main" id="{69544C8F-774E-A948-8C6E-A8F01794317F}"/>
+              </a:ext>
+            </a:extLst>
+          </p:cNvPr>
+          <p:cNvSpPr/>
+          <p:nvPr/>
+        </p:nvSpPr>
+        <p:spPr>
+          <a:xfrm>
+            <a:off x="1236612" y="4965521"/>
+            <a:ext cx="2301766" cy="255790"/>
+          </a:xfrm>
+          <a:prstGeom prst="rect">
+            <a:avLst/>
+          </a:prstGeom>
+          <a:solidFill>
+            <a:schemeClr val="accent4">
+              <a:lumMod val="60000"/>
+              <a:lumOff val="40000"/>
+            </a:schemeClr>
+          </a:solidFill>
+        </p:spPr>
+        <p:style>
+          <a:lnRef idx="2">
+            <a:schemeClr val="accent1">
+              <a:shade val="50000"/>
+            </a:schemeClr>
+          </a:lnRef>
+          <a:fillRef idx="1">
+            <a:schemeClr val="accent1"/>
+          </a:fillRef>
+          <a:effectRef idx="0">
+            <a:schemeClr val="accent1"/>
+          </a:effectRef>
+          <a:fontRef idx="minor">
+            <a:schemeClr val="lt1"/>
+          </a:fontRef>
+        </p:style>
+        <p:txBody>
+          <a:bodyPr rtlCol="0" anchor="ctr"/>
+          <a:lstStyle/>
+          <a:p>
+            <a:pPr algn="ctr"/>
+            <a:r>
+              <a:rPr lang="en-US" dirty="0">
+                <a:solidFill>
+                  <a:schemeClr val="accent5"/>
+                </a:solidFill>
+              </a:rPr>
+              <a:t>z.prototype</a:t>
+            </a:r>
+          </a:p>
+        </p:txBody>
+      </p:sp>
+      <p:sp>
+        <p:nvSpPr>
+          <p:cNvPr id="75" name="Rectangle 74">
+            <a:extLst>
+              <a:ext uri="{FF2B5EF4-FFF2-40B4-BE49-F238E27FC236}">
+                <a16:creationId xmlns:a16="http://schemas.microsoft.com/office/drawing/2014/main" id="{EB0E037D-471F-404B-A72A-F46E5C9F7333}"/>
+              </a:ext>
+            </a:extLst>
+          </p:cNvPr>
+          <p:cNvSpPr/>
+          <p:nvPr/>
+        </p:nvSpPr>
+        <p:spPr>
+          <a:xfrm>
+            <a:off x="1231351" y="6117069"/>
+            <a:ext cx="2301766" cy="298318"/>
+          </a:xfrm>
+          <a:prstGeom prst="rect">
+            <a:avLst/>
+          </a:prstGeom>
+        </p:spPr>
+        <p:style>
+          <a:lnRef idx="2">
+            <a:schemeClr val="accent1">
+              <a:shade val="50000"/>
+            </a:schemeClr>
+          </a:lnRef>
+          <a:fillRef idx="1">
+            <a:schemeClr val="accent1"/>
+          </a:fillRef>
+          <a:effectRef idx="0">
+            <a:schemeClr val="accent1"/>
+          </a:effectRef>
+          <a:fontRef idx="minor">
+            <a:schemeClr val="lt1"/>
+          </a:fontRef>
+        </p:style>
+        <p:txBody>
+          <a:bodyPr rtlCol="0" anchor="ctr"/>
+          <a:lstStyle/>
+          <a:p>
+            <a:pPr algn="ctr"/>
+            <a:r>
+              <a:rPr lang="en-US" dirty="0"/>
+              <a:t>__proto__</a:t>
+            </a:r>
+          </a:p>
+        </p:txBody>
+      </p:sp>
+      <p:sp>
+        <p:nvSpPr>
+          <p:cNvPr id="76" name="Rectangle 75">
+            <a:extLst>
+              <a:ext uri="{FF2B5EF4-FFF2-40B4-BE49-F238E27FC236}">
+                <a16:creationId xmlns:a16="http://schemas.microsoft.com/office/drawing/2014/main" id="{BC9B2E45-837C-8B4C-8C4B-C0AC72325B69}"/>
+              </a:ext>
+            </a:extLst>
+          </p:cNvPr>
+          <p:cNvSpPr/>
+          <p:nvPr/>
+        </p:nvSpPr>
+        <p:spPr>
+          <a:xfrm>
+            <a:off x="1231351" y="5586301"/>
+            <a:ext cx="2301766" cy="295417"/>
+          </a:xfrm>
+          <a:prstGeom prst="rect">
+            <a:avLst/>
+          </a:prstGeom>
+        </p:spPr>
+        <p:style>
+          <a:lnRef idx="2">
+            <a:schemeClr val="accent1">
+              <a:shade val="50000"/>
+            </a:schemeClr>
+          </a:lnRef>
+          <a:fillRef idx="1">
+            <a:schemeClr val="accent1"/>
+          </a:fillRef>
+          <a:effectRef idx="0">
+            <a:schemeClr val="accent1"/>
+          </a:effectRef>
+          <a:fontRef idx="minor">
+            <a:schemeClr val="lt1"/>
+          </a:fontRef>
+        </p:style>
+        <p:txBody>
+          <a:bodyPr rtlCol="0" anchor="ctr"/>
+          <a:lstStyle/>
+          <a:p>
+            <a:pPr algn="ctr"/>
+            <a:r>
+              <a:rPr lang="en-US" dirty="0"/>
+              <a:t>Properties</a:t>
+            </a:r>
+          </a:p>
+        </p:txBody>
+      </p:sp>
+      <p:sp>
+        <p:nvSpPr>
+          <p:cNvPr id="77" name="Rectangle 76">
+            <a:extLst>
+              <a:ext uri="{FF2B5EF4-FFF2-40B4-BE49-F238E27FC236}">
+                <a16:creationId xmlns:a16="http://schemas.microsoft.com/office/drawing/2014/main" id="{7DA13726-FAD2-474C-A591-B2C32610790A}"/>
+              </a:ext>
+            </a:extLst>
+          </p:cNvPr>
+          <p:cNvSpPr/>
+          <p:nvPr/>
+        </p:nvSpPr>
+        <p:spPr>
+          <a:xfrm>
+            <a:off x="1236612" y="5228267"/>
+            <a:ext cx="2301766" cy="295416"/>
+          </a:xfrm>
+          <a:prstGeom prst="rect">
+            <a:avLst/>
+          </a:prstGeom>
+        </p:spPr>
+        <p:style>
+          <a:lnRef idx="2">
+            <a:schemeClr val="accent1">
+              <a:shade val="50000"/>
+            </a:schemeClr>
+          </a:lnRef>
+          <a:fillRef idx="1">
+            <a:schemeClr val="accent1"/>
+          </a:fillRef>
+          <a:effectRef idx="0">
+            <a:schemeClr val="accent1"/>
+          </a:effectRef>
+          <a:fontRef idx="minor">
+            <a:schemeClr val="lt1"/>
+          </a:fontRef>
+        </p:style>
+        <p:txBody>
+          <a:bodyPr rtlCol="0" anchor="ctr"/>
+          <a:lstStyle/>
+          <a:p>
+            <a:pPr algn="ctr"/>
+            <a:r>
+              <a:rPr lang="en-US" dirty="0"/>
+              <a:t>Methods</a:t>
+            </a:r>
+          </a:p>
+        </p:txBody>
+      </p:sp>
+      <p:sp>
+        <p:nvSpPr>
+          <p:cNvPr id="78" name="Rectangle 77">
+            <a:extLst>
+              <a:ext uri="{FF2B5EF4-FFF2-40B4-BE49-F238E27FC236}">
+                <a16:creationId xmlns:a16="http://schemas.microsoft.com/office/drawing/2014/main" id="{ABEDA302-F7D1-7C40-9F17-1CE89EB29D6E}"/>
+              </a:ext>
+            </a:extLst>
+          </p:cNvPr>
+          <p:cNvSpPr/>
+          <p:nvPr/>
+        </p:nvSpPr>
+        <p:spPr>
+          <a:xfrm>
+            <a:off x="1231351" y="5870170"/>
+            <a:ext cx="2301766" cy="245316"/>
+          </a:xfrm>
+          <a:prstGeom prst="rect">
+            <a:avLst/>
+          </a:prstGeom>
+        </p:spPr>
+        <p:style>
+          <a:lnRef idx="2">
+            <a:schemeClr val="accent1">
+              <a:shade val="50000"/>
+            </a:schemeClr>
+          </a:lnRef>
+          <a:fillRef idx="1">
+            <a:schemeClr val="accent1"/>
+          </a:fillRef>
+          <a:effectRef idx="0">
+            <a:schemeClr val="accent1"/>
+          </a:effectRef>
+          <a:fontRef idx="minor">
+            <a:schemeClr val="lt1"/>
+          </a:fontRef>
+        </p:style>
+        <p:txBody>
+          <a:bodyPr rtlCol="0" anchor="ctr"/>
+          <a:lstStyle/>
+          <a:p>
+            <a:pPr algn="ctr"/>
+            <a:r>
+              <a:rPr lang="en-US" dirty="0"/>
+              <a:t>number : 26</a:t>
+            </a:r>
+          </a:p>
+        </p:txBody>
+      </p:sp>
+      <p:sp>
+        <p:nvSpPr>
+          <p:cNvPr id="79" name="TextBox 78">
+            <a:extLst>
+              <a:ext uri="{FF2B5EF4-FFF2-40B4-BE49-F238E27FC236}">
+                <a16:creationId xmlns:a16="http://schemas.microsoft.com/office/drawing/2014/main" id="{20818FAA-FD2E-1449-A0D7-0859CCBECF34}"/>
+              </a:ext>
+            </a:extLst>
+          </p:cNvPr>
+          <p:cNvSpPr txBox="1"/>
+          <p:nvPr/>
+        </p:nvSpPr>
+        <p:spPr>
+          <a:xfrm>
+            <a:off x="1210333" y="4547473"/>
+            <a:ext cx="2301766" cy="461665"/>
+          </a:xfrm>
+          <a:prstGeom prst="rect">
+            <a:avLst/>
+          </a:prstGeom>
+          <a:noFill/>
+        </p:spPr>
+        <p:txBody>
+          <a:bodyPr wrap="square" rtlCol="0">
+            <a:spAutoFit/>
+          </a:bodyPr>
+          <a:lstStyle/>
+          <a:p>
+            <a:pPr algn="ctr"/>
+            <a:r>
+              <a:rPr lang="en-US" sz="2400" dirty="0">
+                <a:solidFill>
+                  <a:schemeClr val="accent4">
+                    <a:lumMod val="40000"/>
+                    <a:lumOff val="60000"/>
+                  </a:schemeClr>
+                </a:solidFill>
+              </a:rPr>
+              <a:t>z</a:t>
+            </a:r>
+          </a:p>
+        </p:txBody>
+      </p:sp>
+      <p:cxnSp>
+        <p:nvCxnSpPr>
+          <p:cNvPr id="93" name="Elbow Connector 92">
+            <a:extLst>
+              <a:ext uri="{FF2B5EF4-FFF2-40B4-BE49-F238E27FC236}">
+                <a16:creationId xmlns:a16="http://schemas.microsoft.com/office/drawing/2014/main" id="{0FFB42D7-865C-A444-884C-C8055524C1D5}"/>
+              </a:ext>
+            </a:extLst>
+          </p:cNvPr>
+          <p:cNvCxnSpPr>
+            <a:stCxn id="26" idx="3"/>
+            <a:endCxn id="17" idx="1"/>
+          </p:cNvCxnSpPr>
+          <p:nvPr/>
+        </p:nvCxnSpPr>
+        <p:spPr>
+          <a:xfrm>
+            <a:off x="3510449" y="2200554"/>
+            <a:ext cx="1424159" cy="324684"/>
+          </a:xfrm>
+          <a:prstGeom prst="bentConnector3">
+            <a:avLst/>
+          </a:prstGeom>
+          <a:ln>
+            <a:solidFill>
+              <a:schemeClr val="accent4"/>
+            </a:solidFill>
+            <a:tailEnd type="triangle"/>
+          </a:ln>
+        </p:spPr>
+        <p:style>
+          <a:lnRef idx="1">
+            <a:schemeClr val="accent1"/>
+          </a:lnRef>
+          <a:fillRef idx="0">
+            <a:schemeClr val="accent1"/>
+          </a:fillRef>
+          <a:effectRef idx="0">
+            <a:schemeClr val="accent1"/>
+          </a:effectRef>
+          <a:fontRef idx="minor">
+            <a:schemeClr val="tx1"/>
+          </a:fontRef>
+        </p:style>
+      </p:cxnSp>
+      <p:cxnSp>
+        <p:nvCxnSpPr>
+          <p:cNvPr id="95" name="Elbow Connector 94">
+            <a:extLst>
+              <a:ext uri="{FF2B5EF4-FFF2-40B4-BE49-F238E27FC236}">
+                <a16:creationId xmlns:a16="http://schemas.microsoft.com/office/drawing/2014/main" id="{C476E5A8-3000-1D40-B772-186786819EDE}"/>
+              </a:ext>
+            </a:extLst>
+          </p:cNvPr>
+          <p:cNvCxnSpPr>
+            <a:stCxn id="68" idx="3"/>
+            <a:endCxn id="17" idx="1"/>
+          </p:cNvCxnSpPr>
+          <p:nvPr/>
+        </p:nvCxnSpPr>
+        <p:spPr>
+          <a:xfrm flipV="1">
+            <a:off x="3509418" y="2525238"/>
+            <a:ext cx="1425190" cy="1683530"/>
+          </a:xfrm>
+          <a:prstGeom prst="bentConnector3">
+            <a:avLst/>
+          </a:prstGeom>
+          <a:ln>
+            <a:solidFill>
+              <a:schemeClr val="accent4"/>
+            </a:solidFill>
+            <a:tailEnd type="triangle"/>
+          </a:ln>
+        </p:spPr>
+        <p:style>
+          <a:lnRef idx="1">
+            <a:schemeClr val="accent1"/>
+          </a:lnRef>
+          <a:fillRef idx="0">
+            <a:schemeClr val="accent1"/>
+          </a:fillRef>
+          <a:effectRef idx="0">
+            <a:schemeClr val="accent1"/>
+          </a:effectRef>
+          <a:fontRef idx="minor">
+            <a:schemeClr val="tx1"/>
+          </a:fontRef>
+        </p:style>
+      </p:cxnSp>
+      <p:cxnSp>
+        <p:nvCxnSpPr>
+          <p:cNvPr id="97" name="Elbow Connector 96">
+            <a:extLst>
+              <a:ext uri="{FF2B5EF4-FFF2-40B4-BE49-F238E27FC236}">
+                <a16:creationId xmlns:a16="http://schemas.microsoft.com/office/drawing/2014/main" id="{AC6B9CD8-A6B6-3644-9C37-8F8A9A9BD970}"/>
+              </a:ext>
+            </a:extLst>
+          </p:cNvPr>
+          <p:cNvCxnSpPr>
+            <a:stCxn id="75" idx="3"/>
+            <a:endCxn id="17" idx="1"/>
+          </p:cNvCxnSpPr>
+          <p:nvPr/>
+        </p:nvCxnSpPr>
+        <p:spPr>
+          <a:xfrm flipV="1">
+            <a:off x="3533117" y="2525238"/>
+            <a:ext cx="1401491" cy="3740990"/>
+          </a:xfrm>
+          <a:prstGeom prst="bentConnector3">
+            <a:avLst/>
+          </a:prstGeom>
+          <a:ln>
+            <a:solidFill>
+              <a:schemeClr val="accent4"/>
+            </a:solidFill>
+            <a:tailEnd type="triangle"/>
+          </a:ln>
+        </p:spPr>
+        <p:style>
+          <a:lnRef idx="1">
+            <a:schemeClr val="accent1"/>
+          </a:lnRef>
+          <a:fillRef idx="0">
+            <a:schemeClr val="accent1"/>
+          </a:fillRef>
+          <a:effectRef idx="0">
+            <a:schemeClr val="accent1"/>
+          </a:effectRef>
+          <a:fontRef idx="minor">
+            <a:schemeClr val="tx1"/>
+          </a:fontRef>
+        </p:style>
+      </p:cxnSp>
+      <p:cxnSp>
+        <p:nvCxnSpPr>
+          <p:cNvPr id="99" name="Elbow Connector 98">
+            <a:extLst>
+              <a:ext uri="{FF2B5EF4-FFF2-40B4-BE49-F238E27FC236}">
+                <a16:creationId xmlns:a16="http://schemas.microsoft.com/office/drawing/2014/main" id="{A1927D39-E79C-594C-B35B-DD77B4137DC8}"/>
+              </a:ext>
+            </a:extLst>
+          </p:cNvPr>
+          <p:cNvCxnSpPr>
+            <a:stCxn id="18" idx="3"/>
+            <a:endCxn id="5" idx="1"/>
+          </p:cNvCxnSpPr>
+          <p:nvPr/>
+        </p:nvCxnSpPr>
+        <p:spPr>
+          <a:xfrm flipV="1">
+            <a:off x="7236374" y="1061323"/>
+            <a:ext cx="1439916" cy="2969858"/>
+          </a:xfrm>
+          <a:prstGeom prst="bentConnector3">
+            <a:avLst/>
+          </a:prstGeom>
+          <a:ln>
+            <a:solidFill>
+              <a:schemeClr val="accent4"/>
+            </a:solidFill>
+            <a:tailEnd type="triangle"/>
+          </a:ln>
+        </p:spPr>
+        <p:style>
+          <a:lnRef idx="1">
+            <a:schemeClr val="accent1"/>
+          </a:lnRef>
+          <a:fillRef idx="0">
+            <a:schemeClr val="accent1"/>
+          </a:fillRef>
+          <a:effectRef idx="0">
+            <a:schemeClr val="accent1"/>
+          </a:effectRef>
+          <a:fontRef idx="minor">
+            <a:schemeClr val="tx1"/>
+          </a:fontRef>
+        </p:style>
+      </p:cxnSp>
+      <p:cxnSp>
+        <p:nvCxnSpPr>
+          <p:cNvPr id="101" name="Elbow Connector 100">
+            <a:extLst>
+              <a:ext uri="{FF2B5EF4-FFF2-40B4-BE49-F238E27FC236}">
+                <a16:creationId xmlns:a16="http://schemas.microsoft.com/office/drawing/2014/main" id="{8679B1FA-6B2F-7543-8EF7-83277A99443C}"/>
+              </a:ext>
+            </a:extLst>
+          </p:cNvPr>
+          <p:cNvCxnSpPr>
+            <a:stCxn id="6" idx="3"/>
+            <a:endCxn id="10" idx="3"/>
+          </p:cNvCxnSpPr>
+          <p:nvPr/>
+        </p:nvCxnSpPr>
+        <p:spPr>
+          <a:xfrm>
+            <a:off x="10978056" y="2495138"/>
+            <a:ext cx="12700" cy="1608614"/>
+          </a:xfrm>
+          <a:prstGeom prst="bentConnector3">
+            <a:avLst>
+              <a:gd name="adj1" fmla="val 1800000"/>
+            </a:avLst>
+          </a:prstGeom>
+          <a:ln>
+            <a:solidFill>
+              <a:schemeClr val="accent4"/>
+            </a:solidFill>
+            <a:tailEnd type="triangle"/>
+          </a:ln>
+        </p:spPr>
+        <p:style>
+          <a:lnRef idx="1">
+            <a:schemeClr val="accent1"/>
+          </a:lnRef>
+          <a:fillRef idx="0">
+            <a:schemeClr val="accent1"/>
+          </a:fillRef>
+          <a:effectRef idx="0">
+            <a:schemeClr val="accent1"/>
+          </a:effectRef>
+          <a:fontRef idx="minor">
+            <a:schemeClr val="tx1"/>
+          </a:fontRef>
+        </p:style>
+      </p:cxnSp>
+      <p:cxnSp>
+        <p:nvCxnSpPr>
+          <p:cNvPr id="103" name="Elbow Connector 102">
+            <a:extLst>
+              <a:ext uri="{FF2B5EF4-FFF2-40B4-BE49-F238E27FC236}">
+                <a16:creationId xmlns:a16="http://schemas.microsoft.com/office/drawing/2014/main" id="{D2FE8BE6-0EFD-A543-9AD2-9393220C4513}"/>
+              </a:ext>
+            </a:extLst>
+          </p:cNvPr>
+          <p:cNvCxnSpPr>
+            <a:stCxn id="11" idx="3"/>
+            <a:endCxn id="14" idx="3"/>
+          </p:cNvCxnSpPr>
+          <p:nvPr/>
+        </p:nvCxnSpPr>
+        <p:spPr>
+          <a:xfrm flipH="1">
+            <a:off x="10405242" y="5619268"/>
+            <a:ext cx="572814" cy="937746"/>
+          </a:xfrm>
+          <a:prstGeom prst="bentConnector3">
+            <a:avLst>
+              <a:gd name="adj1" fmla="val -39908"/>
+            </a:avLst>
+          </a:prstGeom>
+          <a:ln>
+            <a:solidFill>
+              <a:schemeClr val="accent4"/>
+            </a:solidFill>
+            <a:tailEnd type="triangle"/>
+          </a:ln>
+        </p:spPr>
+        <p:style>
+          <a:lnRef idx="1">
+            <a:schemeClr val="accent1"/>
+          </a:lnRef>
+          <a:fillRef idx="0">
+            <a:schemeClr val="accent1"/>
+          </a:fillRef>
+          <a:effectRef idx="0">
+            <a:schemeClr val="accent1"/>
+          </a:effectRef>
+          <a:fontRef idx="minor">
+            <a:schemeClr val="tx1"/>
+          </a:fontRef>
+        </p:style>
+      </p:cxnSp>
     </p:spTree>
     <p:extLst>
       <p:ext uri="{BB962C8B-B14F-4D97-AF65-F5344CB8AC3E}">
-        <p14:creationId xmlns:p14="http://schemas.microsoft.com/office/powerpoint/2010/main" val="4156855875"/>
+        <p14:creationId xmlns:p14="http://schemas.microsoft.com/office/powerpoint/2010/main" val="4160920452"/>
       </p:ext>
     </p:extLst>
   </p:cSld>
@@ -7849,4 +10717,299 @@
     </a:ext>
   </a:extLst>
 </a:theme>
+</file>
+
+<file path=ppt/theme/theme2.xml><?xml version="1.0" encoding="utf-8"?>
+<a:theme xmlns:a="http://schemas.openxmlformats.org/drawingml/2006/main" name="Office Theme">
+  <a:themeElements>
+    <a:clrScheme name="Office">
+      <a:dk1>
+        <a:sysClr val="windowText" lastClr="000000"/>
+      </a:dk1>
+      <a:lt1>
+        <a:sysClr val="window" lastClr="FFFFFF"/>
+      </a:lt1>
+      <a:dk2>
+        <a:srgbClr val="44546A"/>
+      </a:dk2>
+      <a:lt2>
+        <a:srgbClr val="E7E6E6"/>
+      </a:lt2>
+      <a:accent1>
+        <a:srgbClr val="4472C4"/>
+      </a:accent1>
+      <a:accent2>
+        <a:srgbClr val="ED7D31"/>
+      </a:accent2>
+      <a:accent3>
+        <a:srgbClr val="A5A5A5"/>
+      </a:accent3>
+      <a:accent4>
+        <a:srgbClr val="FFC000"/>
+      </a:accent4>
+      <a:accent5>
+        <a:srgbClr val="5B9BD5"/>
+      </a:accent5>
+      <a:accent6>
+        <a:srgbClr val="70AD47"/>
+      </a:accent6>
+      <a:hlink>
+        <a:srgbClr val="0563C1"/>
+      </a:hlink>
+      <a:folHlink>
+        <a:srgbClr val="954F72"/>
+      </a:folHlink>
+    </a:clrScheme>
+    <a:fontScheme name="Office">
+      <a:majorFont>
+        <a:latin typeface="Calibri Light" panose="020F0302020204030204"/>
+        <a:ea typeface=""/>
+        <a:cs typeface=""/>
+        <a:font script="Jpan" typeface="游ゴシック Light"/>
+        <a:font script="Hang" typeface="맑은 고딕"/>
+        <a:font script="Hans" typeface="等线 Light"/>
+        <a:font script="Hant" typeface="新細明體"/>
+        <a:font script="Arab" typeface="Times New Roman"/>
+        <a:font script="Hebr" typeface="Times New Roman"/>
+        <a:font script="Thai" typeface="Angsana New"/>
+        <a:font script="Ethi" typeface="Nyala"/>
+        <a:font script="Beng" typeface="Vrinda"/>
+        <a:font script="Gujr" typeface="Shruti"/>
+        <a:font script="Khmr" typeface="MoolBoran"/>
+        <a:font script="Knda" typeface="Tunga"/>
+        <a:font script="Guru" typeface="Raavi"/>
+        <a:font script="Cans" typeface="Euphemia"/>
+        <a:font script="Cher" typeface="Plantagenet Cherokee"/>
+        <a:font script="Yiii" typeface="Microsoft Yi Baiti"/>
+        <a:font script="Tibt" typeface="Microsoft Himalaya"/>
+        <a:font script="Thaa" typeface="MV Boli"/>
+        <a:font script="Deva" typeface="Mangal"/>
+        <a:font script="Telu" typeface="Gautami"/>
+        <a:font script="Taml" typeface="Latha"/>
+        <a:font script="Syrc" typeface="Estrangelo Edessa"/>
+        <a:font script="Orya" typeface="Kalinga"/>
+        <a:font script="Mlym" typeface="Kartika"/>
+        <a:font script="Laoo" typeface="DokChampa"/>
+        <a:font script="Sinh" typeface="Iskoola Pota"/>
+        <a:font script="Mong" typeface="Mongolian Baiti"/>
+        <a:font script="Viet" typeface="Times New Roman"/>
+        <a:font script="Uigh" typeface="Microsoft Uighur"/>
+        <a:font script="Geor" typeface="Sylfaen"/>
+        <a:font script="Armn" typeface="Arial"/>
+        <a:font script="Bugi" typeface="Leelawadee UI"/>
+        <a:font script="Bopo" typeface="Microsoft JhengHei"/>
+        <a:font script="Java" typeface="Javanese Text"/>
+        <a:font script="Lisu" typeface="Segoe UI"/>
+        <a:font script="Mymr" typeface="Myanmar Text"/>
+        <a:font script="Nkoo" typeface="Ebrima"/>
+        <a:font script="Olck" typeface="Nirmala UI"/>
+        <a:font script="Osma" typeface="Ebrima"/>
+        <a:font script="Phag" typeface="Phagspa"/>
+        <a:font script="Syrn" typeface="Estrangelo Edessa"/>
+        <a:font script="Syrj" typeface="Estrangelo Edessa"/>
+        <a:font script="Syre" typeface="Estrangelo Edessa"/>
+        <a:font script="Sora" typeface="Nirmala UI"/>
+        <a:font script="Tale" typeface="Microsoft Tai Le"/>
+        <a:font script="Talu" typeface="Microsoft New Tai Lue"/>
+        <a:font script="Tfng" typeface="Ebrima"/>
+      </a:majorFont>
+      <a:minorFont>
+        <a:latin typeface="Calibri" panose="020F0502020204030204"/>
+        <a:ea typeface=""/>
+        <a:cs typeface=""/>
+        <a:font script="Jpan" typeface="游ゴシック"/>
+        <a:font script="Hang" typeface="맑은 고딕"/>
+        <a:font script="Hans" typeface="等线"/>
+        <a:font script="Hant" typeface="新細明體"/>
+        <a:font script="Arab" typeface="Arial"/>
+        <a:font script="Hebr" typeface="Arial"/>
+        <a:font script="Thai" typeface="Cordia New"/>
+        <a:font script="Ethi" typeface="Nyala"/>
+        <a:font script="Beng" typeface="Vrinda"/>
+        <a:font script="Gujr" typeface="Shruti"/>
+        <a:font script="Khmr" typeface="DaunPenh"/>
+        <a:font script="Knda" typeface="Tunga"/>
+        <a:font script="Guru" typeface="Raavi"/>
+        <a:font script="Cans" typeface="Euphemia"/>
+        <a:font script="Cher" typeface="Plantagenet Cherokee"/>
+        <a:font script="Yiii" typeface="Microsoft Yi Baiti"/>
+        <a:font script="Tibt" typeface="Microsoft Himalaya"/>
+        <a:font script="Thaa" typeface="MV Boli"/>
+        <a:font script="Deva" typeface="Mangal"/>
+        <a:font script="Telu" typeface="Gautami"/>
+        <a:font script="Taml" typeface="Latha"/>
+        <a:font script="Syrc" typeface="Estrangelo Edessa"/>
+        <a:font script="Orya" typeface="Kalinga"/>
+        <a:font script="Mlym" typeface="Kartika"/>
+        <a:font script="Laoo" typeface="DokChampa"/>
+        <a:font script="Sinh" typeface="Iskoola Pota"/>
+        <a:font script="Mong" typeface="Mongolian Baiti"/>
+        <a:font script="Viet" typeface="Arial"/>
+        <a:font script="Uigh" typeface="Microsoft Uighur"/>
+        <a:font script="Geor" typeface="Sylfaen"/>
+        <a:font script="Armn" typeface="Arial"/>
+        <a:font script="Bugi" typeface="Leelawadee UI"/>
+        <a:font script="Bopo" typeface="Microsoft JhengHei"/>
+        <a:font script="Java" typeface="Javanese Text"/>
+        <a:font script="Lisu" typeface="Segoe UI"/>
+        <a:font script="Mymr" typeface="Myanmar Text"/>
+        <a:font script="Nkoo" typeface="Ebrima"/>
+        <a:font script="Olck" typeface="Nirmala UI"/>
+        <a:font script="Osma" typeface="Ebrima"/>
+        <a:font script="Phag" typeface="Phagspa"/>
+        <a:font script="Syrn" typeface="Estrangelo Edessa"/>
+        <a:font script="Syrj" typeface="Estrangelo Edessa"/>
+        <a:font script="Syre" typeface="Estrangelo Edessa"/>
+        <a:font script="Sora" typeface="Nirmala UI"/>
+        <a:font script="Tale" typeface="Microsoft Tai Le"/>
+        <a:font script="Talu" typeface="Microsoft New Tai Lue"/>
+        <a:font script="Tfng" typeface="Ebrima"/>
+      </a:minorFont>
+    </a:fontScheme>
+    <a:fmtScheme name="Office">
+      <a:fillStyleLst>
+        <a:solidFill>
+          <a:schemeClr val="phClr"/>
+        </a:solidFill>
+        <a:gradFill rotWithShape="1">
+          <a:gsLst>
+            <a:gs pos="0">
+              <a:schemeClr val="phClr">
+                <a:lumMod val="110000"/>
+                <a:satMod val="105000"/>
+                <a:tint val="67000"/>
+              </a:schemeClr>
+            </a:gs>
+            <a:gs pos="50000">
+              <a:schemeClr val="phClr">
+                <a:lumMod val="105000"/>
+                <a:satMod val="103000"/>
+                <a:tint val="73000"/>
+              </a:schemeClr>
+            </a:gs>
+            <a:gs pos="100000">
+              <a:schemeClr val="phClr">
+                <a:lumMod val="105000"/>
+                <a:satMod val="109000"/>
+                <a:tint val="81000"/>
+              </a:schemeClr>
+            </a:gs>
+          </a:gsLst>
+          <a:lin ang="5400000" scaled="0"/>
+        </a:gradFill>
+        <a:gradFill rotWithShape="1">
+          <a:gsLst>
+            <a:gs pos="0">
+              <a:schemeClr val="phClr">
+                <a:satMod val="103000"/>
+                <a:lumMod val="102000"/>
+                <a:tint val="94000"/>
+              </a:schemeClr>
+            </a:gs>
+            <a:gs pos="50000">
+              <a:schemeClr val="phClr">
+                <a:satMod val="110000"/>
+                <a:lumMod val="100000"/>
+                <a:shade val="100000"/>
+              </a:schemeClr>
+            </a:gs>
+            <a:gs pos="100000">
+              <a:schemeClr val="phClr">
+                <a:lumMod val="99000"/>
+                <a:satMod val="120000"/>
+                <a:shade val="78000"/>
+              </a:schemeClr>
+            </a:gs>
+          </a:gsLst>
+          <a:lin ang="5400000" scaled="0"/>
+        </a:gradFill>
+      </a:fillStyleLst>
+      <a:lnStyleLst>
+        <a:ln w="6350" cap="flat" cmpd="sng" algn="ctr">
+          <a:solidFill>
+            <a:schemeClr val="phClr"/>
+          </a:solidFill>
+          <a:prstDash val="solid"/>
+          <a:miter lim="800000"/>
+        </a:ln>
+        <a:ln w="12700" cap="flat" cmpd="sng" algn="ctr">
+          <a:solidFill>
+            <a:schemeClr val="phClr"/>
+          </a:solidFill>
+          <a:prstDash val="solid"/>
+          <a:miter lim="800000"/>
+        </a:ln>
+        <a:ln w="19050" cap="flat" cmpd="sng" algn="ctr">
+          <a:solidFill>
+            <a:schemeClr val="phClr"/>
+          </a:solidFill>
+          <a:prstDash val="solid"/>
+          <a:miter lim="800000"/>
+        </a:ln>
+      </a:lnStyleLst>
+      <a:effectStyleLst>
+        <a:effectStyle>
+          <a:effectLst/>
+        </a:effectStyle>
+        <a:effectStyle>
+          <a:effectLst/>
+        </a:effectStyle>
+        <a:effectStyle>
+          <a:effectLst>
+            <a:outerShdw blurRad="57150" dist="19050" dir="5400000" algn="ctr" rotWithShape="0">
+              <a:srgbClr val="000000">
+                <a:alpha val="63000"/>
+              </a:srgbClr>
+            </a:outerShdw>
+          </a:effectLst>
+        </a:effectStyle>
+      </a:effectStyleLst>
+      <a:bgFillStyleLst>
+        <a:solidFill>
+          <a:schemeClr val="phClr"/>
+        </a:solidFill>
+        <a:solidFill>
+          <a:schemeClr val="phClr">
+            <a:tint val="95000"/>
+            <a:satMod val="170000"/>
+          </a:schemeClr>
+        </a:solidFill>
+        <a:gradFill rotWithShape="1">
+          <a:gsLst>
+            <a:gs pos="0">
+              <a:schemeClr val="phClr">
+                <a:tint val="93000"/>
+                <a:satMod val="150000"/>
+                <a:shade val="98000"/>
+                <a:lumMod val="102000"/>
+              </a:schemeClr>
+            </a:gs>
+            <a:gs pos="50000">
+              <a:schemeClr val="phClr">
+                <a:tint val="98000"/>
+                <a:satMod val="130000"/>
+                <a:shade val="90000"/>
+                <a:lumMod val="103000"/>
+              </a:schemeClr>
+            </a:gs>
+            <a:gs pos="100000">
+              <a:schemeClr val="phClr">
+                <a:shade val="63000"/>
+                <a:satMod val="120000"/>
+              </a:schemeClr>
+            </a:gs>
+          </a:gsLst>
+          <a:lin ang="5400000" scaled="0"/>
+        </a:gradFill>
+      </a:bgFillStyleLst>
+    </a:fmtScheme>
+  </a:themeElements>
+  <a:objectDefaults/>
+  <a:extraClrSchemeLst/>
+  <a:extLst>
+    <a:ext uri="{05A4C25C-085E-4340-85A3-A5531E510DB2}">
+      <thm15:themeFamily xmlns:thm15="http://schemas.microsoft.com/office/thememl/2012/main" name="Office Theme" id="{62F939B6-93AF-4DB8-9C6B-D6C7DFDC589F}" vid="{4A3C46E8-61CC-4603-A589-7422A47A8E4A}"/>
+    </a:ext>
+  </a:extLst>
+</a:theme>
 </file>
</xml_diff>